<commit_message>
updated figures and images
</commit_message>
<xml_diff>
--- a/images/tables.pptx
+++ b/images/tables.pptx
@@ -7,6 +7,7 @@
   <p:sldIdLst>
     <p:sldId id="256" r:id="rId2"/>
     <p:sldId id="257" r:id="rId3"/>
+    <p:sldId id="258" r:id="rId4"/>
   </p:sldIdLst>
   <p:sldSz cx="12192000" cy="6858000"/>
   <p:notesSz cx="6858000" cy="9144000"/>
@@ -155,10 +156,9 @@
           </a:lstStyle>
           <a:p>
             <a:r>
-              <a:rPr lang="en-US" smtClean="0"/>
+              <a:rPr lang="en-US"/>
               <a:t>Click to edit Master title style</a:t>
             </a:r>
-            <a:endParaRPr lang="en-US"/>
           </a:p>
         </p:txBody>
       </p:sp>
@@ -220,10 +220,9 @@
           </a:lstStyle>
           <a:p>
             <a:r>
-              <a:rPr lang="en-US" smtClean="0"/>
+              <a:rPr lang="en-US"/>
               <a:t>Click to edit Master subtitle style</a:t>
             </a:r>
-            <a:endParaRPr lang="en-US"/>
           </a:p>
         </p:txBody>
       </p:sp>
@@ -244,7 +243,7 @@
           <a:p>
             <a:fld id="{CE747A43-080A-4603-9B3A-A5F647E9A431}" type="datetimeFigureOut">
               <a:rPr lang="en-US" smtClean="0"/>
-              <a:t>12/10/2018</a:t>
+              <a:t>12/11/18</a:t>
             </a:fld>
             <a:endParaRPr lang="en-US"/>
           </a:p>
@@ -338,10 +337,9 @@
           <a:lstStyle/>
           <a:p>
             <a:r>
-              <a:rPr lang="en-US" smtClean="0"/>
+              <a:rPr lang="en-US"/>
               <a:t>Click to edit Master title style</a:t>
             </a:r>
-            <a:endParaRPr lang="en-US"/>
           </a:p>
         </p:txBody>
       </p:sp>
@@ -362,38 +360,37 @@
           <a:p>
             <a:pPr lvl="0"/>
             <a:r>
-              <a:rPr lang="en-US" smtClean="0"/>
+              <a:rPr lang="en-US"/>
               <a:t>Click to edit Master text styles</a:t>
             </a:r>
           </a:p>
           <a:p>
             <a:pPr lvl="1"/>
             <a:r>
-              <a:rPr lang="en-US" smtClean="0"/>
+              <a:rPr lang="en-US"/>
               <a:t>Second level</a:t>
             </a:r>
           </a:p>
           <a:p>
             <a:pPr lvl="2"/>
             <a:r>
-              <a:rPr lang="en-US" smtClean="0"/>
+              <a:rPr lang="en-US"/>
               <a:t>Third level</a:t>
             </a:r>
           </a:p>
           <a:p>
             <a:pPr lvl="3"/>
             <a:r>
-              <a:rPr lang="en-US" smtClean="0"/>
+              <a:rPr lang="en-US"/>
               <a:t>Fourth level</a:t>
             </a:r>
           </a:p>
           <a:p>
             <a:pPr lvl="4"/>
             <a:r>
-              <a:rPr lang="en-US" smtClean="0"/>
+              <a:rPr lang="en-US"/>
               <a:t>Fifth level</a:t>
             </a:r>
-            <a:endParaRPr lang="en-US"/>
           </a:p>
         </p:txBody>
       </p:sp>
@@ -414,7 +411,7 @@
           <a:p>
             <a:fld id="{CE747A43-080A-4603-9B3A-A5F647E9A431}" type="datetimeFigureOut">
               <a:rPr lang="en-US" smtClean="0"/>
-              <a:t>12/10/2018</a:t>
+              <a:t>12/11/18</a:t>
             </a:fld>
             <a:endParaRPr lang="en-US"/>
           </a:p>
@@ -513,10 +510,9 @@
           <a:lstStyle/>
           <a:p>
             <a:r>
-              <a:rPr lang="en-US" smtClean="0"/>
+              <a:rPr lang="en-US"/>
               <a:t>Click to edit Master title style</a:t>
             </a:r>
-            <a:endParaRPr lang="en-US"/>
           </a:p>
         </p:txBody>
       </p:sp>
@@ -542,38 +538,37 @@
           <a:p>
             <a:pPr lvl="0"/>
             <a:r>
-              <a:rPr lang="en-US" smtClean="0"/>
+              <a:rPr lang="en-US"/>
               <a:t>Click to edit Master text styles</a:t>
             </a:r>
           </a:p>
           <a:p>
             <a:pPr lvl="1"/>
             <a:r>
-              <a:rPr lang="en-US" smtClean="0"/>
+              <a:rPr lang="en-US"/>
               <a:t>Second level</a:t>
             </a:r>
           </a:p>
           <a:p>
             <a:pPr lvl="2"/>
             <a:r>
-              <a:rPr lang="en-US" smtClean="0"/>
+              <a:rPr lang="en-US"/>
               <a:t>Third level</a:t>
             </a:r>
           </a:p>
           <a:p>
             <a:pPr lvl="3"/>
             <a:r>
-              <a:rPr lang="en-US" smtClean="0"/>
+              <a:rPr lang="en-US"/>
               <a:t>Fourth level</a:t>
             </a:r>
           </a:p>
           <a:p>
             <a:pPr lvl="4"/>
             <a:r>
-              <a:rPr lang="en-US" smtClean="0"/>
+              <a:rPr lang="en-US"/>
               <a:t>Fifth level</a:t>
             </a:r>
-            <a:endParaRPr lang="en-US"/>
           </a:p>
         </p:txBody>
       </p:sp>
@@ -594,7 +589,7 @@
           <a:p>
             <a:fld id="{CE747A43-080A-4603-9B3A-A5F647E9A431}" type="datetimeFigureOut">
               <a:rPr lang="en-US" smtClean="0"/>
-              <a:t>12/10/2018</a:t>
+              <a:t>12/11/18</a:t>
             </a:fld>
             <a:endParaRPr lang="en-US"/>
           </a:p>
@@ -688,10 +683,9 @@
           <a:lstStyle/>
           <a:p>
             <a:r>
-              <a:rPr lang="en-US" smtClean="0"/>
+              <a:rPr lang="en-US"/>
               <a:t>Click to edit Master title style</a:t>
             </a:r>
-            <a:endParaRPr lang="en-US"/>
           </a:p>
         </p:txBody>
       </p:sp>
@@ -712,38 +706,37 @@
           <a:p>
             <a:pPr lvl="0"/>
             <a:r>
-              <a:rPr lang="en-US" smtClean="0"/>
+              <a:rPr lang="en-US"/>
               <a:t>Click to edit Master text styles</a:t>
             </a:r>
           </a:p>
           <a:p>
             <a:pPr lvl="1"/>
             <a:r>
-              <a:rPr lang="en-US" smtClean="0"/>
+              <a:rPr lang="en-US"/>
               <a:t>Second level</a:t>
             </a:r>
           </a:p>
           <a:p>
             <a:pPr lvl="2"/>
             <a:r>
-              <a:rPr lang="en-US" smtClean="0"/>
+              <a:rPr lang="en-US"/>
               <a:t>Third level</a:t>
             </a:r>
           </a:p>
           <a:p>
             <a:pPr lvl="3"/>
             <a:r>
-              <a:rPr lang="en-US" smtClean="0"/>
+              <a:rPr lang="en-US"/>
               <a:t>Fourth level</a:t>
             </a:r>
           </a:p>
           <a:p>
             <a:pPr lvl="4"/>
             <a:r>
-              <a:rPr lang="en-US" smtClean="0"/>
+              <a:rPr lang="en-US"/>
               <a:t>Fifth level</a:t>
             </a:r>
-            <a:endParaRPr lang="en-US"/>
           </a:p>
         </p:txBody>
       </p:sp>
@@ -764,7 +757,7 @@
           <a:p>
             <a:fld id="{CE747A43-080A-4603-9B3A-A5F647E9A431}" type="datetimeFigureOut">
               <a:rPr lang="en-US" smtClean="0"/>
-              <a:t>12/10/2018</a:t>
+              <a:t>12/11/18</a:t>
             </a:fld>
             <a:endParaRPr lang="en-US"/>
           </a:p>
@@ -867,10 +860,9 @@
           </a:lstStyle>
           <a:p>
             <a:r>
-              <a:rPr lang="en-US" smtClean="0"/>
+              <a:rPr lang="en-US"/>
               <a:t>Click to edit Master title style</a:t>
             </a:r>
-            <a:endParaRPr lang="en-US"/>
           </a:p>
         </p:txBody>
       </p:sp>
@@ -987,7 +979,7 @@
           <a:p>
             <a:pPr lvl="0"/>
             <a:r>
-              <a:rPr lang="en-US" smtClean="0"/>
+              <a:rPr lang="en-US"/>
               <a:t>Click to edit Master text styles</a:t>
             </a:r>
           </a:p>
@@ -1010,7 +1002,7 @@
           <a:p>
             <a:fld id="{CE747A43-080A-4603-9B3A-A5F647E9A431}" type="datetimeFigureOut">
               <a:rPr lang="en-US" smtClean="0"/>
-              <a:t>12/10/2018</a:t>
+              <a:t>12/11/18</a:t>
             </a:fld>
             <a:endParaRPr lang="en-US"/>
           </a:p>
@@ -1104,10 +1096,9 @@
           <a:lstStyle/>
           <a:p>
             <a:r>
-              <a:rPr lang="en-US" smtClean="0"/>
+              <a:rPr lang="en-US"/>
               <a:t>Click to edit Master title style</a:t>
             </a:r>
-            <a:endParaRPr lang="en-US"/>
           </a:p>
         </p:txBody>
       </p:sp>
@@ -1133,38 +1124,37 @@
           <a:p>
             <a:pPr lvl="0"/>
             <a:r>
-              <a:rPr lang="en-US" smtClean="0"/>
+              <a:rPr lang="en-US"/>
               <a:t>Click to edit Master text styles</a:t>
             </a:r>
           </a:p>
           <a:p>
             <a:pPr lvl="1"/>
             <a:r>
-              <a:rPr lang="en-US" smtClean="0"/>
+              <a:rPr lang="en-US"/>
               <a:t>Second level</a:t>
             </a:r>
           </a:p>
           <a:p>
             <a:pPr lvl="2"/>
             <a:r>
-              <a:rPr lang="en-US" smtClean="0"/>
+              <a:rPr lang="en-US"/>
               <a:t>Third level</a:t>
             </a:r>
           </a:p>
           <a:p>
             <a:pPr lvl="3"/>
             <a:r>
-              <a:rPr lang="en-US" smtClean="0"/>
+              <a:rPr lang="en-US"/>
               <a:t>Fourth level</a:t>
             </a:r>
           </a:p>
           <a:p>
             <a:pPr lvl="4"/>
             <a:r>
-              <a:rPr lang="en-US" smtClean="0"/>
+              <a:rPr lang="en-US"/>
               <a:t>Fifth level</a:t>
             </a:r>
-            <a:endParaRPr lang="en-US"/>
           </a:p>
         </p:txBody>
       </p:sp>
@@ -1190,38 +1180,37 @@
           <a:p>
             <a:pPr lvl="0"/>
             <a:r>
-              <a:rPr lang="en-US" smtClean="0"/>
+              <a:rPr lang="en-US"/>
               <a:t>Click to edit Master text styles</a:t>
             </a:r>
           </a:p>
           <a:p>
             <a:pPr lvl="1"/>
             <a:r>
-              <a:rPr lang="en-US" smtClean="0"/>
+              <a:rPr lang="en-US"/>
               <a:t>Second level</a:t>
             </a:r>
           </a:p>
           <a:p>
             <a:pPr lvl="2"/>
             <a:r>
-              <a:rPr lang="en-US" smtClean="0"/>
+              <a:rPr lang="en-US"/>
               <a:t>Third level</a:t>
             </a:r>
           </a:p>
           <a:p>
             <a:pPr lvl="3"/>
             <a:r>
-              <a:rPr lang="en-US" smtClean="0"/>
+              <a:rPr lang="en-US"/>
               <a:t>Fourth level</a:t>
             </a:r>
           </a:p>
           <a:p>
             <a:pPr lvl="4"/>
             <a:r>
-              <a:rPr lang="en-US" smtClean="0"/>
+              <a:rPr lang="en-US"/>
               <a:t>Fifth level</a:t>
             </a:r>
-            <a:endParaRPr lang="en-US"/>
           </a:p>
         </p:txBody>
       </p:sp>
@@ -1242,7 +1231,7 @@
           <a:p>
             <a:fld id="{CE747A43-080A-4603-9B3A-A5F647E9A431}" type="datetimeFigureOut">
               <a:rPr lang="en-US" smtClean="0"/>
-              <a:t>12/10/2018</a:t>
+              <a:t>12/11/18</a:t>
             </a:fld>
             <a:endParaRPr lang="en-US"/>
           </a:p>
@@ -1341,10 +1330,9 @@
           <a:lstStyle/>
           <a:p>
             <a:r>
-              <a:rPr lang="en-US" smtClean="0"/>
+              <a:rPr lang="en-US"/>
               <a:t>Click to edit Master title style</a:t>
             </a:r>
-            <a:endParaRPr lang="en-US"/>
           </a:p>
         </p:txBody>
       </p:sp>
@@ -1407,7 +1395,7 @@
           <a:p>
             <a:pPr lvl="0"/>
             <a:r>
-              <a:rPr lang="en-US" smtClean="0"/>
+              <a:rPr lang="en-US"/>
               <a:t>Click to edit Master text styles</a:t>
             </a:r>
           </a:p>
@@ -1435,38 +1423,37 @@
           <a:p>
             <a:pPr lvl="0"/>
             <a:r>
-              <a:rPr lang="en-US" smtClean="0"/>
+              <a:rPr lang="en-US"/>
               <a:t>Click to edit Master text styles</a:t>
             </a:r>
           </a:p>
           <a:p>
             <a:pPr lvl="1"/>
             <a:r>
-              <a:rPr lang="en-US" smtClean="0"/>
+              <a:rPr lang="en-US"/>
               <a:t>Second level</a:t>
             </a:r>
           </a:p>
           <a:p>
             <a:pPr lvl="2"/>
             <a:r>
-              <a:rPr lang="en-US" smtClean="0"/>
+              <a:rPr lang="en-US"/>
               <a:t>Third level</a:t>
             </a:r>
           </a:p>
           <a:p>
             <a:pPr lvl="3"/>
             <a:r>
-              <a:rPr lang="en-US" smtClean="0"/>
+              <a:rPr lang="en-US"/>
               <a:t>Fourth level</a:t>
             </a:r>
           </a:p>
           <a:p>
             <a:pPr lvl="4"/>
             <a:r>
-              <a:rPr lang="en-US" smtClean="0"/>
+              <a:rPr lang="en-US"/>
               <a:t>Fifth level</a:t>
             </a:r>
-            <a:endParaRPr lang="en-US"/>
           </a:p>
         </p:txBody>
       </p:sp>
@@ -1529,7 +1516,7 @@
           <a:p>
             <a:pPr lvl="0"/>
             <a:r>
-              <a:rPr lang="en-US" smtClean="0"/>
+              <a:rPr lang="en-US"/>
               <a:t>Click to edit Master text styles</a:t>
             </a:r>
           </a:p>
@@ -1557,38 +1544,37 @@
           <a:p>
             <a:pPr lvl="0"/>
             <a:r>
-              <a:rPr lang="en-US" smtClean="0"/>
+              <a:rPr lang="en-US"/>
               <a:t>Click to edit Master text styles</a:t>
             </a:r>
           </a:p>
           <a:p>
             <a:pPr lvl="1"/>
             <a:r>
-              <a:rPr lang="en-US" smtClean="0"/>
+              <a:rPr lang="en-US"/>
               <a:t>Second level</a:t>
             </a:r>
           </a:p>
           <a:p>
             <a:pPr lvl="2"/>
             <a:r>
-              <a:rPr lang="en-US" smtClean="0"/>
+              <a:rPr lang="en-US"/>
               <a:t>Third level</a:t>
             </a:r>
           </a:p>
           <a:p>
             <a:pPr lvl="3"/>
             <a:r>
-              <a:rPr lang="en-US" smtClean="0"/>
+              <a:rPr lang="en-US"/>
               <a:t>Fourth level</a:t>
             </a:r>
           </a:p>
           <a:p>
             <a:pPr lvl="4"/>
             <a:r>
-              <a:rPr lang="en-US" smtClean="0"/>
+              <a:rPr lang="en-US"/>
               <a:t>Fifth level</a:t>
             </a:r>
-            <a:endParaRPr lang="en-US"/>
           </a:p>
         </p:txBody>
       </p:sp>
@@ -1609,7 +1595,7 @@
           <a:p>
             <a:fld id="{CE747A43-080A-4603-9B3A-A5F647E9A431}" type="datetimeFigureOut">
               <a:rPr lang="en-US" smtClean="0"/>
-              <a:t>12/10/2018</a:t>
+              <a:t>12/11/18</a:t>
             </a:fld>
             <a:endParaRPr lang="en-US"/>
           </a:p>
@@ -1703,10 +1689,9 @@
           <a:lstStyle/>
           <a:p>
             <a:r>
-              <a:rPr lang="en-US" smtClean="0"/>
+              <a:rPr lang="en-US"/>
               <a:t>Click to edit Master title style</a:t>
             </a:r>
-            <a:endParaRPr lang="en-US"/>
           </a:p>
         </p:txBody>
       </p:sp>
@@ -1727,7 +1712,7 @@
           <a:p>
             <a:fld id="{CE747A43-080A-4603-9B3A-A5F647E9A431}" type="datetimeFigureOut">
               <a:rPr lang="en-US" smtClean="0"/>
-              <a:t>12/10/2018</a:t>
+              <a:t>12/11/18</a:t>
             </a:fld>
             <a:endParaRPr lang="en-US"/>
           </a:p>
@@ -1822,7 +1807,7 @@
           <a:p>
             <a:fld id="{CE747A43-080A-4603-9B3A-A5F647E9A431}" type="datetimeFigureOut">
               <a:rPr lang="en-US" smtClean="0"/>
-              <a:t>12/10/2018</a:t>
+              <a:t>12/11/18</a:t>
             </a:fld>
             <a:endParaRPr lang="en-US"/>
           </a:p>
@@ -1925,10 +1910,9 @@
           </a:lstStyle>
           <a:p>
             <a:r>
-              <a:rPr lang="en-US" smtClean="0"/>
+              <a:rPr lang="en-US"/>
               <a:t>Click to edit Master title style</a:t>
             </a:r>
-            <a:endParaRPr lang="en-US"/>
           </a:p>
         </p:txBody>
       </p:sp>
@@ -1982,38 +1966,37 @@
           <a:p>
             <a:pPr lvl="0"/>
             <a:r>
-              <a:rPr lang="en-US" smtClean="0"/>
+              <a:rPr lang="en-US"/>
               <a:t>Click to edit Master text styles</a:t>
             </a:r>
           </a:p>
           <a:p>
             <a:pPr lvl="1"/>
             <a:r>
-              <a:rPr lang="en-US" smtClean="0"/>
+              <a:rPr lang="en-US"/>
               <a:t>Second level</a:t>
             </a:r>
           </a:p>
           <a:p>
             <a:pPr lvl="2"/>
             <a:r>
-              <a:rPr lang="en-US" smtClean="0"/>
+              <a:rPr lang="en-US"/>
               <a:t>Third level</a:t>
             </a:r>
           </a:p>
           <a:p>
             <a:pPr lvl="3"/>
             <a:r>
-              <a:rPr lang="en-US" smtClean="0"/>
+              <a:rPr lang="en-US"/>
               <a:t>Fourth level</a:t>
             </a:r>
           </a:p>
           <a:p>
             <a:pPr lvl="4"/>
             <a:r>
-              <a:rPr lang="en-US" smtClean="0"/>
+              <a:rPr lang="en-US"/>
               <a:t>Fifth level</a:t>
             </a:r>
-            <a:endParaRPr lang="en-US"/>
           </a:p>
         </p:txBody>
       </p:sp>
@@ -2076,7 +2059,7 @@
           <a:p>
             <a:pPr lvl="0"/>
             <a:r>
-              <a:rPr lang="en-US" smtClean="0"/>
+              <a:rPr lang="en-US"/>
               <a:t>Click to edit Master text styles</a:t>
             </a:r>
           </a:p>
@@ -2099,7 +2082,7 @@
           <a:p>
             <a:fld id="{CE747A43-080A-4603-9B3A-A5F647E9A431}" type="datetimeFigureOut">
               <a:rPr lang="en-US" smtClean="0"/>
-              <a:t>12/10/2018</a:t>
+              <a:t>12/11/18</a:t>
             </a:fld>
             <a:endParaRPr lang="en-US"/>
           </a:p>
@@ -2202,10 +2185,9 @@
           </a:lstStyle>
           <a:p>
             <a:r>
-              <a:rPr lang="en-US" smtClean="0"/>
+              <a:rPr lang="en-US"/>
               <a:t>Click to edit Master title style</a:t>
             </a:r>
-            <a:endParaRPr lang="en-US"/>
           </a:p>
         </p:txBody>
       </p:sp>
@@ -2329,7 +2311,7 @@
           <a:p>
             <a:pPr lvl="0"/>
             <a:r>
-              <a:rPr lang="en-US" smtClean="0"/>
+              <a:rPr lang="en-US"/>
               <a:t>Click to edit Master text styles</a:t>
             </a:r>
           </a:p>
@@ -2352,7 +2334,7 @@
           <a:p>
             <a:fld id="{CE747A43-080A-4603-9B3A-A5F647E9A431}" type="datetimeFigureOut">
               <a:rPr lang="en-US" smtClean="0"/>
-              <a:t>12/10/2018</a:t>
+              <a:t>12/11/18</a:t>
             </a:fld>
             <a:endParaRPr lang="en-US"/>
           </a:p>
@@ -2461,10 +2443,9 @@
           <a:lstStyle/>
           <a:p>
             <a:r>
-              <a:rPr lang="en-US" smtClean="0"/>
+              <a:rPr lang="en-US"/>
               <a:t>Click to edit Master title style</a:t>
             </a:r>
-            <a:endParaRPr lang="en-US"/>
           </a:p>
         </p:txBody>
       </p:sp>
@@ -2495,38 +2476,37 @@
           <a:p>
             <a:pPr lvl="0"/>
             <a:r>
-              <a:rPr lang="en-US" smtClean="0"/>
+              <a:rPr lang="en-US"/>
               <a:t>Click to edit Master text styles</a:t>
             </a:r>
           </a:p>
           <a:p>
             <a:pPr lvl="1"/>
             <a:r>
-              <a:rPr lang="en-US" smtClean="0"/>
+              <a:rPr lang="en-US"/>
               <a:t>Second level</a:t>
             </a:r>
           </a:p>
           <a:p>
             <a:pPr lvl="2"/>
             <a:r>
-              <a:rPr lang="en-US" smtClean="0"/>
+              <a:rPr lang="en-US"/>
               <a:t>Third level</a:t>
             </a:r>
           </a:p>
           <a:p>
             <a:pPr lvl="3"/>
             <a:r>
-              <a:rPr lang="en-US" smtClean="0"/>
+              <a:rPr lang="en-US"/>
               <a:t>Fourth level</a:t>
             </a:r>
           </a:p>
           <a:p>
             <a:pPr lvl="4"/>
             <a:r>
-              <a:rPr lang="en-US" smtClean="0"/>
+              <a:rPr lang="en-US"/>
               <a:t>Fifth level</a:t>
             </a:r>
-            <a:endParaRPr lang="en-US"/>
           </a:p>
         </p:txBody>
       </p:sp>
@@ -2565,7 +2545,7 @@
           <a:p>
             <a:fld id="{CE747A43-080A-4603-9B3A-A5F647E9A431}" type="datetimeFigureOut">
               <a:rPr lang="en-US" smtClean="0"/>
-              <a:t>12/10/2018</a:t>
+              <a:t>12/11/18</a:t>
             </a:fld>
             <a:endParaRPr lang="en-US"/>
           </a:p>
@@ -2979,7 +2959,7 @@
           <p:nvPr>
             <p:extLst>
               <p:ext uri="{D42A27DB-BD31-4B8C-83A1-F6EECF244321}">
-                <p14:modId xmlns:p14="http://schemas.microsoft.com/office/powerpoint/2010/main" val="353724167"/>
+                <p14:modId xmlns:p14="http://schemas.microsoft.com/office/powerpoint/2010/main" val="3627895247"/>
               </p:ext>
             </p:extLst>
           </p:nvPr>
@@ -2995,9 +2975,27 @@
                 <a:tableStyleId>{8799B23B-EC83-4686-B30A-512413B5E67A}</a:tableStyleId>
               </a:tblPr>
               <a:tblGrid>
-                <a:gridCol w="2071681"/>
-                <a:gridCol w="1009290"/>
-                <a:gridCol w="1009292"/>
+                <a:gridCol w="2071681">
+                  <a:extLst>
+                    <a:ext uri="{9D8B030D-6E8A-4147-A177-3AD203B41FA5}">
+                      <a16:colId xmlns:a16="http://schemas.microsoft.com/office/drawing/2014/main" val="20000"/>
+                    </a:ext>
+                  </a:extLst>
+                </a:gridCol>
+                <a:gridCol w="1009290">
+                  <a:extLst>
+                    <a:ext uri="{9D8B030D-6E8A-4147-A177-3AD203B41FA5}">
+                      <a16:colId xmlns:a16="http://schemas.microsoft.com/office/drawing/2014/main" val="20001"/>
+                    </a:ext>
+                  </a:extLst>
+                </a:gridCol>
+                <a:gridCol w="1009292">
+                  <a:extLst>
+                    <a:ext uri="{9D8B030D-6E8A-4147-A177-3AD203B41FA5}">
+                      <a16:colId xmlns:a16="http://schemas.microsoft.com/office/drawing/2014/main" val="20002"/>
+                    </a:ext>
+                  </a:extLst>
+                </a:gridCol>
               </a:tblGrid>
               <a:tr h="452619">
                 <a:tc>
@@ -3096,13 +3094,7 @@
                         <a:rPr lang="en-US" sz="1100" cap="all" dirty="0">
                           <a:effectLst/>
                         </a:rPr>
-                        <a:t> (n = </a:t>
-                      </a:r>
-                      <a:r>
-                        <a:rPr lang="en-US" sz="1100" cap="all" dirty="0" smtClean="0">
-                          <a:effectLst/>
-                        </a:rPr>
-                        <a:t>186)</a:t>
+                        <a:t> (n = 186)</a:t>
                       </a:r>
                       <a:endParaRPr lang="en-US" sz="1100" dirty="0">
                         <a:effectLst/>
@@ -3168,6 +3160,11 @@
                   </a:txBody>
                   <a:tcPr marL="68580" marR="68580" marT="0" marB="0"/>
                 </a:tc>
+                <a:extLst>
+                  <a:ext uri="{0D108BD9-81ED-4DB2-BD59-A6C34878D82A}">
+                    <a16:rowId xmlns:a16="http://schemas.microsoft.com/office/drawing/2014/main" val="10000"/>
+                  </a:ext>
+                </a:extLst>
               </a:tr>
               <a:tr h="250002">
                 <a:tc>
@@ -3266,6 +3263,11 @@
                   </a:txBody>
                   <a:tcPr marL="68580" marR="68580" marT="0" marB="0"/>
                 </a:tc>
+                <a:extLst>
+                  <a:ext uri="{0D108BD9-81ED-4DB2-BD59-A6C34878D82A}">
+                    <a16:rowId xmlns:a16="http://schemas.microsoft.com/office/drawing/2014/main" val="10001"/>
+                  </a:ext>
+                </a:extLst>
               </a:tr>
               <a:tr h="250002">
                 <a:tc>
@@ -3364,6 +3366,11 @@
                   </a:txBody>
                   <a:tcPr marL="68580" marR="68580" marT="0" marB="0"/>
                 </a:tc>
+                <a:extLst>
+                  <a:ext uri="{0D108BD9-81ED-4DB2-BD59-A6C34878D82A}">
+                    <a16:rowId xmlns:a16="http://schemas.microsoft.com/office/drawing/2014/main" val="10002"/>
+                  </a:ext>
+                </a:extLst>
               </a:tr>
               <a:tr h="240199">
                 <a:tc>
@@ -3462,6 +3469,11 @@
                   </a:txBody>
                   <a:tcPr marL="68580" marR="68580" marT="0" marB="0"/>
                 </a:tc>
+                <a:extLst>
+                  <a:ext uri="{0D108BD9-81ED-4DB2-BD59-A6C34878D82A}">
+                    <a16:rowId xmlns:a16="http://schemas.microsoft.com/office/drawing/2014/main" val="10003"/>
+                  </a:ext>
+                </a:extLst>
               </a:tr>
               <a:tr h="250002">
                 <a:tc>
@@ -3513,7 +3525,7 @@
                         </a:spcAft>
                       </a:pPr>
                       <a:r>
-                        <a:rPr lang="en-US" sz="1100" dirty="0" smtClean="0">
+                        <a:rPr lang="en-US" sz="1100" dirty="0">
                           <a:effectLst/>
                         </a:rPr>
                         <a:t>57.6</a:t>
@@ -3545,7 +3557,7 @@
                         </a:spcAft>
                       </a:pPr>
                       <a:r>
-                        <a:rPr lang="en-US" sz="1100" dirty="0" smtClean="0">
+                        <a:rPr lang="en-US" sz="1100" dirty="0">
                           <a:effectLst/>
                         </a:rPr>
                         <a:t>61.3</a:t>
@@ -3560,6 +3572,11 @@
                   </a:txBody>
                   <a:tcPr marL="68580" marR="68580" marT="0" marB="0"/>
                 </a:tc>
+                <a:extLst>
+                  <a:ext uri="{0D108BD9-81ED-4DB2-BD59-A6C34878D82A}">
+                    <a16:rowId xmlns:a16="http://schemas.microsoft.com/office/drawing/2014/main" val="10004"/>
+                  </a:ext>
+                </a:extLst>
               </a:tr>
               <a:tr h="250002">
                 <a:tc>
@@ -3658,6 +3675,11 @@
                   </a:txBody>
                   <a:tcPr marL="68580" marR="68580" marT="0" marB="0"/>
                 </a:tc>
+                <a:extLst>
+                  <a:ext uri="{0D108BD9-81ED-4DB2-BD59-A6C34878D82A}">
+                    <a16:rowId xmlns:a16="http://schemas.microsoft.com/office/drawing/2014/main" val="10005"/>
+                  </a:ext>
+                </a:extLst>
               </a:tr>
               <a:tr h="250002">
                 <a:tc>
@@ -3756,6 +3778,11 @@
                   </a:txBody>
                   <a:tcPr marL="68580" marR="68580" marT="0" marB="0"/>
                 </a:tc>
+                <a:extLst>
+                  <a:ext uri="{0D108BD9-81ED-4DB2-BD59-A6C34878D82A}">
+                    <a16:rowId xmlns:a16="http://schemas.microsoft.com/office/drawing/2014/main" val="10006"/>
+                  </a:ext>
+                </a:extLst>
               </a:tr>
               <a:tr h="250002">
                 <a:tc>
@@ -3854,6 +3881,11 @@
                   </a:txBody>
                   <a:tcPr marL="68580" marR="68580" marT="0" marB="0"/>
                 </a:tc>
+                <a:extLst>
+                  <a:ext uri="{0D108BD9-81ED-4DB2-BD59-A6C34878D82A}">
+                    <a16:rowId xmlns:a16="http://schemas.microsoft.com/office/drawing/2014/main" val="10007"/>
+                  </a:ext>
+                </a:extLst>
               </a:tr>
               <a:tr h="221408">
                 <a:tc>
@@ -3952,6 +3984,11 @@
                   </a:txBody>
                   <a:tcPr marL="68580" marR="68580" marT="0" marB="0"/>
                 </a:tc>
+                <a:extLst>
+                  <a:ext uri="{0D108BD9-81ED-4DB2-BD59-A6C34878D82A}">
+                    <a16:rowId xmlns:a16="http://schemas.microsoft.com/office/drawing/2014/main" val="10008"/>
+                  </a:ext>
+                </a:extLst>
               </a:tr>
               <a:tr h="221408">
                 <a:tc>
@@ -4050,6 +4087,11 @@
                   </a:txBody>
                   <a:tcPr marL="68580" marR="68580" marT="0" marB="0"/>
                 </a:tc>
+                <a:extLst>
+                  <a:ext uri="{0D108BD9-81ED-4DB2-BD59-A6C34878D82A}">
+                    <a16:rowId xmlns:a16="http://schemas.microsoft.com/office/drawing/2014/main" val="10009"/>
+                  </a:ext>
+                </a:extLst>
               </a:tr>
               <a:tr h="221408">
                 <a:tc>
@@ -4101,10 +4143,81 @@
                         </a:spcAft>
                       </a:pPr>
                       <a:r>
-                        <a:rPr lang="en-US" sz="1100">
-                          <a:effectLst/>
-                        </a:rPr>
-                        <a:t>96</a:t>
+                        <a:rPr lang="en-US" sz="1100" dirty="0">
+                          <a:effectLst/>
+                        </a:rPr>
+                        <a:t>111</a:t>
+                      </a:r>
+                      <a:endParaRPr lang="en-US" sz="1100" dirty="0">
+                        <a:effectLst/>
+                        <a:latin typeface="Calibri" panose="020F0502020204030204" pitchFamily="34" charset="0"/>
+                        <a:ea typeface="Calibri" panose="020F0502020204030204" pitchFamily="34" charset="0"/>
+                        <a:cs typeface="Times New Roman" panose="02020603050405020304" pitchFamily="18" charset="0"/>
+                      </a:endParaRPr>
+                    </a:p>
+                  </a:txBody>
+                  <a:tcPr marL="68580" marR="68580" marT="0" marB="0"/>
+                </a:tc>
+                <a:tc>
+                  <a:txBody>
+                    <a:bodyPr/>
+                    <a:lstStyle/>
+                    <a:p>
+                      <a:pPr marL="0" marR="0" algn="ctr">
+                        <a:lnSpc>
+                          <a:spcPct val="107000"/>
+                        </a:lnSpc>
+                        <a:spcBef>
+                          <a:spcPts val="0"/>
+                        </a:spcBef>
+                        <a:spcAft>
+                          <a:spcPts val="0"/>
+                        </a:spcAft>
+                      </a:pPr>
+                      <a:r>
+                        <a:rPr lang="en-US" sz="1100" dirty="0">
+                          <a:effectLst/>
+                        </a:rPr>
+                        <a:t>197</a:t>
+                      </a:r>
+                      <a:endParaRPr lang="en-US" sz="1100" dirty="0">
+                        <a:effectLst/>
+                        <a:latin typeface="Calibri" panose="020F0502020204030204" pitchFamily="34" charset="0"/>
+                        <a:ea typeface="Calibri" panose="020F0502020204030204" pitchFamily="34" charset="0"/>
+                        <a:cs typeface="Times New Roman" panose="02020603050405020304" pitchFamily="18" charset="0"/>
+                      </a:endParaRPr>
+                    </a:p>
+                  </a:txBody>
+                  <a:tcPr marL="68580" marR="68580" marT="0" marB="0"/>
+                </a:tc>
+                <a:extLst>
+                  <a:ext uri="{0D108BD9-81ED-4DB2-BD59-A6C34878D82A}">
+                    <a16:rowId xmlns:a16="http://schemas.microsoft.com/office/drawing/2014/main" val="10010"/>
+                  </a:ext>
+                </a:extLst>
+              </a:tr>
+              <a:tr h="221408">
+                <a:tc>
+                  <a:txBody>
+                    <a:bodyPr/>
+                    <a:lstStyle/>
+                    <a:p>
+                      <a:pPr marL="0" marR="0">
+                        <a:lnSpc>
+                          <a:spcPct val="107000"/>
+                        </a:lnSpc>
+                        <a:spcBef>
+                          <a:spcPts val="0"/>
+                        </a:spcBef>
+                        <a:spcAft>
+                          <a:spcPts val="0"/>
+                        </a:spcAft>
+                      </a:pPr>
+                      <a:r>
+                        <a:rPr lang="en-US" sz="1100" cap="all">
+                          <a:effectLst/>
+                        </a:rPr>
+                        <a:t>Years Tobacco Use – Median</a:t>
                       </a:r>
                       <a:endParaRPr lang="en-US" sz="1100">
                         <a:effectLst/>
@@ -4136,7 +4249,7 @@
                         <a:rPr lang="en-US" sz="1100">
                           <a:effectLst/>
                         </a:rPr>
-                        <a:t>150</a:t>
+                        <a:t>25.0</a:t>
                       </a:r>
                       <a:endParaRPr lang="en-US" sz="1100">
                         <a:effectLst/>
@@ -4148,29 +4261,27 @@
                   </a:txBody>
                   <a:tcPr marL="68580" marR="68580" marT="0" marB="0"/>
                 </a:tc>
-              </a:tr>
-              <a:tr h="221408">
-                <a:tc>
-                  <a:txBody>
-                    <a:bodyPr/>
-                    <a:lstStyle/>
-                    <a:p>
-                      <a:pPr marL="0" marR="0">
-                        <a:lnSpc>
-                          <a:spcPct val="107000"/>
-                        </a:lnSpc>
-                        <a:spcBef>
-                          <a:spcPts val="0"/>
-                        </a:spcBef>
-                        <a:spcAft>
-                          <a:spcPts val="0"/>
-                        </a:spcAft>
-                      </a:pPr>
-                      <a:r>
-                        <a:rPr lang="en-US" sz="1100" cap="all">
-                          <a:effectLst/>
-                        </a:rPr>
-                        <a:t>Years Tobacco Use – Median</a:t>
+                <a:tc>
+                  <a:txBody>
+                    <a:bodyPr/>
+                    <a:lstStyle/>
+                    <a:p>
+                      <a:pPr marL="0" marR="0" algn="ctr">
+                        <a:lnSpc>
+                          <a:spcPct val="107000"/>
+                        </a:lnSpc>
+                        <a:spcBef>
+                          <a:spcPts val="0"/>
+                        </a:spcBef>
+                        <a:spcAft>
+                          <a:spcPts val="0"/>
+                        </a:spcAft>
+                      </a:pPr>
+                      <a:r>
+                        <a:rPr lang="en-US" sz="1100">
+                          <a:effectLst/>
+                        </a:rPr>
+                        <a:t>37.5</a:t>
                       </a:r>
                       <a:endParaRPr lang="en-US" sz="1100">
                         <a:effectLst/>
@@ -4182,6 +4293,45 @@
                   </a:txBody>
                   <a:tcPr marL="68580" marR="68580" marT="0" marB="0"/>
                 </a:tc>
+                <a:extLst>
+                  <a:ext uri="{0D108BD9-81ED-4DB2-BD59-A6C34878D82A}">
+                    <a16:rowId xmlns:a16="http://schemas.microsoft.com/office/drawing/2014/main" val="10011"/>
+                  </a:ext>
+                </a:extLst>
+              </a:tr>
+              <a:tr h="221408">
+                <a:tc>
+                  <a:txBody>
+                    <a:bodyPr/>
+                    <a:lstStyle/>
+                    <a:p>
+                      <a:pPr marL="0" marR="0">
+                        <a:lnSpc>
+                          <a:spcPct val="107000"/>
+                        </a:lnSpc>
+                        <a:spcBef>
+                          <a:spcPts val="0"/>
+                        </a:spcBef>
+                        <a:spcAft>
+                          <a:spcPts val="0"/>
+                        </a:spcAft>
+                      </a:pPr>
+                      <a:r>
+                        <a:rPr lang="en-US" sz="1100" cap="all" dirty="0">
+                          <a:effectLst/>
+                        </a:rPr>
+                        <a:t>LeSion Size – no.</a:t>
+                      </a:r>
+                      <a:endParaRPr lang="en-US" sz="1100" dirty="0">
+                        <a:effectLst/>
+                        <a:latin typeface="Calibri" panose="020F0502020204030204" pitchFamily="34" charset="0"/>
+                        <a:ea typeface="Calibri" panose="020F0502020204030204" pitchFamily="34" charset="0"/>
+                        <a:cs typeface="Times New Roman" panose="02020603050405020304" pitchFamily="18" charset="0"/>
+                      </a:endParaRPr>
+                    </a:p>
+                  </a:txBody>
+                  <a:tcPr marL="68580" marR="68580" marT="0" marB="0"/>
+                </a:tc>
                 <a:tc>
                   <a:txBody>
                     <a:bodyPr/>
@@ -4202,7 +4352,7 @@
                         <a:rPr lang="en-US" sz="1100">
                           <a:effectLst/>
                         </a:rPr>
-                        <a:t>25.0</a:t>
+                        <a:t> </a:t>
                       </a:r>
                       <a:endParaRPr lang="en-US" sz="1100">
                         <a:effectLst/>
@@ -4234,7 +4384,7 @@
                         <a:rPr lang="en-US" sz="1100">
                           <a:effectLst/>
                         </a:rPr>
-                        <a:t>37.5</a:t>
+                        <a:t> </a:t>
                       </a:r>
                       <a:endParaRPr lang="en-US" sz="1100">
                         <a:effectLst/>
@@ -4246,6 +4396,11 @@
                   </a:txBody>
                   <a:tcPr marL="68580" marR="68580" marT="0" marB="0"/>
                 </a:tc>
+                <a:extLst>
+                  <a:ext uri="{0D108BD9-81ED-4DB2-BD59-A6C34878D82A}">
+                    <a16:rowId xmlns:a16="http://schemas.microsoft.com/office/drawing/2014/main" val="10012"/>
+                  </a:ext>
+                </a:extLst>
               </a:tr>
               <a:tr h="221408">
                 <a:tc>
@@ -4253,7 +4408,7 @@
                     <a:bodyPr/>
                     <a:lstStyle/>
                     <a:p>
-                      <a:pPr marL="0" marR="0">
+                      <a:pPr marL="457200" marR="0">
                         <a:lnSpc>
                           <a:spcPct val="107000"/>
                         </a:lnSpc>
@@ -4268,7 +4423,7 @@
                         <a:rPr lang="en-US" sz="1100" cap="all">
                           <a:effectLst/>
                         </a:rPr>
-                        <a:t>Legion Size – no.</a:t>
+                        <a:t>Ill Defined</a:t>
                       </a:r>
                       <a:endParaRPr lang="en-US" sz="1100">
                         <a:effectLst/>
@@ -4300,7 +4455,7 @@
                         <a:rPr lang="en-US" sz="1100">
                           <a:effectLst/>
                         </a:rPr>
-                        <a:t> </a:t>
+                        <a:t>44</a:t>
                       </a:r>
                       <a:endParaRPr lang="en-US" sz="1100">
                         <a:effectLst/>
@@ -4332,7 +4487,7 @@
                         <a:rPr lang="en-US" sz="1100">
                           <a:effectLst/>
                         </a:rPr>
-                        <a:t> </a:t>
+                        <a:t>16</a:t>
                       </a:r>
                       <a:endParaRPr lang="en-US" sz="1100">
                         <a:effectLst/>
@@ -4344,6 +4499,11 @@
                   </a:txBody>
                   <a:tcPr marL="68580" marR="68580" marT="0" marB="0"/>
                 </a:tc>
+                <a:extLst>
+                  <a:ext uri="{0D108BD9-81ED-4DB2-BD59-A6C34878D82A}">
+                    <a16:rowId xmlns:a16="http://schemas.microsoft.com/office/drawing/2014/main" val="10013"/>
+                  </a:ext>
+                </a:extLst>
               </a:tr>
               <a:tr h="221408">
                 <a:tc>
@@ -4366,7 +4526,7 @@
                         <a:rPr lang="en-US" sz="1100" cap="all">
                           <a:effectLst/>
                         </a:rPr>
-                        <a:t>Ill Defined</a:t>
+                        <a:t>&lt; 3 cm</a:t>
                       </a:r>
                       <a:endParaRPr lang="en-US" sz="1100">
                         <a:effectLst/>
@@ -4398,7 +4558,7 @@
                         <a:rPr lang="en-US" sz="1100">
                           <a:effectLst/>
                         </a:rPr>
-                        <a:t>44</a:t>
+                        <a:t>99</a:t>
                       </a:r>
                       <a:endParaRPr lang="en-US" sz="1100">
                         <a:effectLst/>
@@ -4427,10 +4587,49 @@
                         </a:spcAft>
                       </a:pPr>
                       <a:r>
-                        <a:rPr lang="en-US" sz="1100">
-                          <a:effectLst/>
-                        </a:rPr>
-                        <a:t>16</a:t>
+                        <a:rPr lang="en-US" sz="1100" dirty="0">
+                          <a:effectLst/>
+                        </a:rPr>
+                        <a:t>96</a:t>
+                      </a:r>
+                      <a:endParaRPr lang="en-US" sz="1100" dirty="0">
+                        <a:effectLst/>
+                        <a:latin typeface="Calibri" panose="020F0502020204030204" pitchFamily="34" charset="0"/>
+                        <a:ea typeface="Calibri" panose="020F0502020204030204" pitchFamily="34" charset="0"/>
+                        <a:cs typeface="Times New Roman" panose="02020603050405020304" pitchFamily="18" charset="0"/>
+                      </a:endParaRPr>
+                    </a:p>
+                  </a:txBody>
+                  <a:tcPr marL="68580" marR="68580" marT="0" marB="0"/>
+                </a:tc>
+                <a:extLst>
+                  <a:ext uri="{0D108BD9-81ED-4DB2-BD59-A6C34878D82A}">
+                    <a16:rowId xmlns:a16="http://schemas.microsoft.com/office/drawing/2014/main" val="10014"/>
+                  </a:ext>
+                </a:extLst>
+              </a:tr>
+              <a:tr h="221408">
+                <a:tc>
+                  <a:txBody>
+                    <a:bodyPr/>
+                    <a:lstStyle/>
+                    <a:p>
+                      <a:pPr marL="457200" marR="0">
+                        <a:lnSpc>
+                          <a:spcPct val="107000"/>
+                        </a:lnSpc>
+                        <a:spcBef>
+                          <a:spcPts val="0"/>
+                        </a:spcBef>
+                        <a:spcAft>
+                          <a:spcPts val="0"/>
+                        </a:spcAft>
+                      </a:pPr>
+                      <a:r>
+                        <a:rPr lang="en-US" sz="1100" cap="all">
+                          <a:effectLst/>
+                        </a:rPr>
+                        <a:t>&gt; 3 CM</a:t>
                       </a:r>
                       <a:endParaRPr lang="en-US" sz="1100">
                         <a:effectLst/>
@@ -4442,29 +4641,27 @@
                   </a:txBody>
                   <a:tcPr marL="68580" marR="68580" marT="0" marB="0"/>
                 </a:tc>
-              </a:tr>
-              <a:tr h="221408">
-                <a:tc>
-                  <a:txBody>
-                    <a:bodyPr/>
-                    <a:lstStyle/>
-                    <a:p>
-                      <a:pPr marL="457200" marR="0">
-                        <a:lnSpc>
-                          <a:spcPct val="107000"/>
-                        </a:lnSpc>
-                        <a:spcBef>
-                          <a:spcPts val="0"/>
-                        </a:spcBef>
-                        <a:spcAft>
-                          <a:spcPts val="0"/>
-                        </a:spcAft>
-                      </a:pPr>
-                      <a:r>
-                        <a:rPr lang="en-US" sz="1100" cap="all">
-                          <a:effectLst/>
-                        </a:rPr>
-                        <a:t>&lt; 3 cm</a:t>
+                <a:tc>
+                  <a:txBody>
+                    <a:bodyPr/>
+                    <a:lstStyle/>
+                    <a:p>
+                      <a:pPr marL="0" marR="0" algn="ctr">
+                        <a:lnSpc>
+                          <a:spcPct val="107000"/>
+                        </a:lnSpc>
+                        <a:spcBef>
+                          <a:spcPts val="0"/>
+                        </a:spcBef>
+                        <a:spcAft>
+                          <a:spcPts val="0"/>
+                        </a:spcAft>
+                      </a:pPr>
+                      <a:r>
+                        <a:rPr lang="en-US" sz="1100">
+                          <a:effectLst/>
+                        </a:rPr>
+                        <a:t>43</a:t>
                       </a:r>
                       <a:endParaRPr lang="en-US" sz="1100">
                         <a:effectLst/>
@@ -4493,42 +4690,10 @@
                         </a:spcAft>
                       </a:pPr>
                       <a:r>
-                        <a:rPr lang="en-US" sz="1100">
-                          <a:effectLst/>
-                        </a:rPr>
-                        <a:t>99</a:t>
-                      </a:r>
-                      <a:endParaRPr lang="en-US" sz="1100">
-                        <a:effectLst/>
-                        <a:latin typeface="Calibri" panose="020F0502020204030204" pitchFamily="34" charset="0"/>
-                        <a:ea typeface="Calibri" panose="020F0502020204030204" pitchFamily="34" charset="0"/>
-                        <a:cs typeface="Times New Roman" panose="02020603050405020304" pitchFamily="18" charset="0"/>
-                      </a:endParaRPr>
-                    </a:p>
-                  </a:txBody>
-                  <a:tcPr marL="68580" marR="68580" marT="0" marB="0"/>
-                </a:tc>
-                <a:tc>
-                  <a:txBody>
-                    <a:bodyPr/>
-                    <a:lstStyle/>
-                    <a:p>
-                      <a:pPr marL="0" marR="0" algn="ctr">
-                        <a:lnSpc>
-                          <a:spcPct val="107000"/>
-                        </a:lnSpc>
-                        <a:spcBef>
-                          <a:spcPts val="0"/>
-                        </a:spcBef>
-                        <a:spcAft>
-                          <a:spcPts val="0"/>
-                        </a:spcAft>
-                      </a:pPr>
-                      <a:r>
                         <a:rPr lang="en-US" sz="1100" dirty="0">
                           <a:effectLst/>
                         </a:rPr>
-                        <a:t>96</a:t>
+                        <a:t>186</a:t>
                       </a:r>
                       <a:endParaRPr lang="en-US" sz="1100" dirty="0">
                         <a:effectLst/>
@@ -4540,104 +4705,11 @@
                   </a:txBody>
                   <a:tcPr marL="68580" marR="68580" marT="0" marB="0"/>
                 </a:tc>
-              </a:tr>
-              <a:tr h="221408">
-                <a:tc>
-                  <a:txBody>
-                    <a:bodyPr/>
-                    <a:lstStyle/>
-                    <a:p>
-                      <a:pPr marL="457200" marR="0">
-                        <a:lnSpc>
-                          <a:spcPct val="107000"/>
-                        </a:lnSpc>
-                        <a:spcBef>
-                          <a:spcPts val="0"/>
-                        </a:spcBef>
-                        <a:spcAft>
-                          <a:spcPts val="0"/>
-                        </a:spcAft>
-                      </a:pPr>
-                      <a:r>
-                        <a:rPr lang="en-US" sz="1100" cap="all">
-                          <a:effectLst/>
-                        </a:rPr>
-                        <a:t>&gt; 3 CM</a:t>
-                      </a:r>
-                      <a:endParaRPr lang="en-US" sz="1100">
-                        <a:effectLst/>
-                        <a:latin typeface="Calibri" panose="020F0502020204030204" pitchFamily="34" charset="0"/>
-                        <a:ea typeface="Calibri" panose="020F0502020204030204" pitchFamily="34" charset="0"/>
-                        <a:cs typeface="Times New Roman" panose="02020603050405020304" pitchFamily="18" charset="0"/>
-                      </a:endParaRPr>
-                    </a:p>
-                  </a:txBody>
-                  <a:tcPr marL="68580" marR="68580" marT="0" marB="0"/>
-                </a:tc>
-                <a:tc>
-                  <a:txBody>
-                    <a:bodyPr/>
-                    <a:lstStyle/>
-                    <a:p>
-                      <a:pPr marL="0" marR="0" algn="ctr">
-                        <a:lnSpc>
-                          <a:spcPct val="107000"/>
-                        </a:lnSpc>
-                        <a:spcBef>
-                          <a:spcPts val="0"/>
-                        </a:spcBef>
-                        <a:spcAft>
-                          <a:spcPts val="0"/>
-                        </a:spcAft>
-                      </a:pPr>
-                      <a:r>
-                        <a:rPr lang="en-US" sz="1100">
-                          <a:effectLst/>
-                        </a:rPr>
-                        <a:t>43</a:t>
-                      </a:r>
-                      <a:endParaRPr lang="en-US" sz="1100">
-                        <a:effectLst/>
-                        <a:latin typeface="Calibri" panose="020F0502020204030204" pitchFamily="34" charset="0"/>
-                        <a:ea typeface="Calibri" panose="020F0502020204030204" pitchFamily="34" charset="0"/>
-                        <a:cs typeface="Times New Roman" panose="02020603050405020304" pitchFamily="18" charset="0"/>
-                      </a:endParaRPr>
-                    </a:p>
-                  </a:txBody>
-                  <a:tcPr marL="68580" marR="68580" marT="0" marB="0"/>
-                </a:tc>
-                <a:tc>
-                  <a:txBody>
-                    <a:bodyPr/>
-                    <a:lstStyle/>
-                    <a:p>
-                      <a:pPr marL="0" marR="0" algn="ctr">
-                        <a:lnSpc>
-                          <a:spcPct val="107000"/>
-                        </a:lnSpc>
-                        <a:spcBef>
-                          <a:spcPts val="0"/>
-                        </a:spcBef>
-                        <a:spcAft>
-                          <a:spcPts val="0"/>
-                        </a:spcAft>
-                      </a:pPr>
-                      <a:r>
-                        <a:rPr lang="en-US" sz="1100" dirty="0">
-                          <a:effectLst/>
-                        </a:rPr>
-                        <a:t>186</a:t>
-                      </a:r>
-                      <a:endParaRPr lang="en-US" sz="1100" dirty="0">
-                        <a:effectLst/>
-                        <a:latin typeface="Calibri" panose="020F0502020204030204" pitchFamily="34" charset="0"/>
-                        <a:ea typeface="Calibri" panose="020F0502020204030204" pitchFamily="34" charset="0"/>
-                        <a:cs typeface="Times New Roman" panose="02020603050405020304" pitchFamily="18" charset="0"/>
-                      </a:endParaRPr>
-                    </a:p>
-                  </a:txBody>
-                  <a:tcPr marL="68580" marR="68580" marT="0" marB="0"/>
-                </a:tc>
+                <a:extLst>
+                  <a:ext uri="{0D108BD9-81ED-4DB2-BD59-A6C34878D82A}">
+                    <a16:rowId xmlns:a16="http://schemas.microsoft.com/office/drawing/2014/main" val="10015"/>
+                  </a:ext>
+                </a:extLst>
               </a:tr>
             </a:tbl>
           </a:graphicData>
@@ -4653,13 +4725,6 @@
   <p:clrMapOvr>
     <a:masterClrMapping/>
   </p:clrMapOvr>
-  <p:timing>
-    <p:tnLst>
-      <p:par>
-        <p:cTn id="1" dur="indefinite" restart="never" nodeType="tmRoot"/>
-      </p:par>
-    </p:tnLst>
-  </p:timing>
 </p:sld>
 </file>
 
@@ -4689,14 +4754,14 @@
           <p:nvPr>
             <p:extLst>
               <p:ext uri="{D42A27DB-BD31-4B8C-83A1-F6EECF244321}">
-                <p14:modId xmlns:p14="http://schemas.microsoft.com/office/powerpoint/2010/main" val="2983667600"/>
+                <p14:modId xmlns:p14="http://schemas.microsoft.com/office/powerpoint/2010/main" val="3839528532"/>
               </p:ext>
             </p:extLst>
           </p:nvPr>
         </p:nvGraphicFramePr>
         <p:xfrm>
           <a:off x="3656259" y="1781098"/>
-          <a:ext cx="4271416" cy="1658701"/>
+          <a:ext cx="4271416" cy="1634890"/>
         </p:xfrm>
         <a:graphic>
           <a:graphicData uri="http://schemas.openxmlformats.org/drawingml/2006/table">
@@ -4705,9 +4770,27 @@
                 <a:tableStyleId>{8799B23B-EC83-4686-B30A-512413B5E67A}</a:tableStyleId>
               </a:tblPr>
               <a:tblGrid>
-                <a:gridCol w="820850"/>
-                <a:gridCol w="862642"/>
-                <a:gridCol w="2587924"/>
+                <a:gridCol w="820850">
+                  <a:extLst>
+                    <a:ext uri="{9D8B030D-6E8A-4147-A177-3AD203B41FA5}">
+                      <a16:colId xmlns:a16="http://schemas.microsoft.com/office/drawing/2014/main" val="20000"/>
+                    </a:ext>
+                  </a:extLst>
+                </a:gridCol>
+                <a:gridCol w="862642">
+                  <a:extLst>
+                    <a:ext uri="{9D8B030D-6E8A-4147-A177-3AD203B41FA5}">
+                      <a16:colId xmlns:a16="http://schemas.microsoft.com/office/drawing/2014/main" val="20001"/>
+                    </a:ext>
+                  </a:extLst>
+                </a:gridCol>
+                <a:gridCol w="2587924">
+                  <a:extLst>
+                    <a:ext uri="{9D8B030D-6E8A-4147-A177-3AD203B41FA5}">
+                      <a16:colId xmlns:a16="http://schemas.microsoft.com/office/drawing/2014/main" val="20002"/>
+                    </a:ext>
+                  </a:extLst>
+                </a:gridCol>
               </a:tblGrid>
               <a:tr h="332374">
                 <a:tc>
@@ -4733,7 +4816,7 @@
                         <a:t> </a:t>
                       </a:r>
                       <a:r>
-                        <a:rPr lang="en-US" sz="1100" cap="all" dirty="0" smtClean="0">
+                        <a:rPr lang="en-US" sz="1100" cap="all" dirty="0">
                           <a:effectLst/>
                           <a:latin typeface="+mn-lt"/>
                           <a:ea typeface="+mn-ea"/>
@@ -4742,7 +4825,7 @@
                         <a:t>Probe</a:t>
                       </a:r>
                       <a:r>
-                        <a:rPr lang="en-US" sz="1100" cap="all" baseline="0" dirty="0" smtClean="0">
+                        <a:rPr lang="en-US" sz="1100" cap="all" baseline="0" dirty="0">
                           <a:effectLst/>
                           <a:latin typeface="+mn-lt"/>
                           <a:ea typeface="+mn-ea"/>
@@ -4777,7 +4860,7 @@
                         </a:spcAft>
                       </a:pPr>
                       <a:r>
-                        <a:rPr lang="en-US" sz="1100" cap="all" dirty="0" smtClean="0">
+                        <a:rPr lang="en-US" sz="1100" cap="all" dirty="0">
                           <a:effectLst/>
                         </a:rPr>
                         <a:t>Gene</a:t>
@@ -4809,7 +4892,7 @@
                         </a:spcAft>
                       </a:pPr>
                       <a:r>
-                        <a:rPr lang="en-US" sz="1100" cap="all" dirty="0" smtClean="0">
+                        <a:rPr lang="en-US" sz="1100" cap="all" dirty="0">
                           <a:effectLst/>
                         </a:rPr>
                         <a:t>Function</a:t>
@@ -4824,6 +4907,11 @@
                   </a:txBody>
                   <a:tcPr marL="68580" marR="68580" marT="0" marB="0"/>
                 </a:tc>
+                <a:extLst>
+                  <a:ext uri="{0D108BD9-81ED-4DB2-BD59-A6C34878D82A}">
+                    <a16:rowId xmlns:a16="http://schemas.microsoft.com/office/drawing/2014/main" val="10000"/>
+                  </a:ext>
+                </a:extLst>
               </a:tr>
               <a:tr h="250002">
                 <a:tc>
@@ -4843,7 +4931,7 @@
                         </a:spcAft>
                       </a:pPr>
                       <a:r>
-                        <a:rPr lang="en-US" sz="1100" cap="all" dirty="0" smtClean="0">
+                        <a:rPr lang="en-US" sz="1100" cap="all" dirty="0">
                           <a:effectLst/>
                         </a:rPr>
                         <a:t>8015607</a:t>
@@ -4875,16 +4963,10 @@
                         </a:spcAft>
                       </a:pPr>
                       <a:r>
-                        <a:rPr lang="en-US" sz="1100" dirty="0" smtClean="0">
-                          <a:effectLst/>
-                        </a:rPr>
-                        <a:t>STAT3</a:t>
-                      </a:r>
-                      <a:r>
                         <a:rPr lang="en-US" sz="1100" dirty="0">
                           <a:effectLst/>
                         </a:rPr>
-                        <a:t> </a:t>
+                        <a:t>STAT3 </a:t>
                       </a:r>
                       <a:endParaRPr lang="en-US" sz="1100" dirty="0">
                         <a:effectLst/>
@@ -4913,16 +4995,10 @@
                         </a:spcAft>
                       </a:pPr>
                       <a:r>
-                        <a:rPr lang="en-US" sz="1100" dirty="0" smtClean="0">
+                        <a:rPr lang="en-US" sz="1100" dirty="0">
                           <a:effectLst/>
                         </a:rPr>
                         <a:t>Transcription factor, elevated expression associated with many cancers</a:t>
-                      </a:r>
-                      <a:r>
-                        <a:rPr lang="en-US" sz="1100" dirty="0">
-                          <a:effectLst/>
-                        </a:rPr>
-                        <a:t> </a:t>
                       </a:r>
                       <a:endParaRPr lang="en-US" sz="1100" dirty="0">
                         <a:effectLst/>
@@ -4934,6 +5010,11 @@
                   </a:txBody>
                   <a:tcPr marL="68580" marR="68580" marT="0" marB="0"/>
                 </a:tc>
+                <a:extLst>
+                  <a:ext uri="{0D108BD9-81ED-4DB2-BD59-A6C34878D82A}">
+                    <a16:rowId xmlns:a16="http://schemas.microsoft.com/office/drawing/2014/main" val="10001"/>
+                  </a:ext>
+                </a:extLst>
               </a:tr>
               <a:tr h="250002">
                 <a:tc>
@@ -4953,13 +5034,183 @@
                         </a:spcAft>
                       </a:pPr>
                       <a:r>
-                        <a:rPr lang="en-US" sz="1100" dirty="0" smtClean="0">
+                        <a:rPr lang="en-US" sz="1100" dirty="0">
                           <a:effectLst/>
                           <a:latin typeface="Calibri" panose="020F0502020204030204" pitchFamily="34" charset="0"/>
                           <a:ea typeface="Calibri" panose="020F0502020204030204" pitchFamily="34" charset="0"/>
                           <a:cs typeface="Times New Roman" panose="02020603050405020304" pitchFamily="18" charset="0"/>
                         </a:rPr>
                         <a:t>8020827</a:t>
+                      </a:r>
+                    </a:p>
+                  </a:txBody>
+                  <a:tcPr marL="68580" marR="68580" marT="0" marB="0"/>
+                </a:tc>
+                <a:tc>
+                  <a:txBody>
+                    <a:bodyPr/>
+                    <a:lstStyle/>
+                    <a:p>
+                      <a:pPr marL="0" marR="0" algn="ctr">
+                        <a:lnSpc>
+                          <a:spcPct val="107000"/>
+                        </a:lnSpc>
+                        <a:spcBef>
+                          <a:spcPts val="0"/>
+                        </a:spcBef>
+                        <a:spcAft>
+                          <a:spcPts val="0"/>
+                        </a:spcAft>
+                      </a:pPr>
+                      <a:r>
+                        <a:rPr lang="en-US" sz="1100" dirty="0">
+                          <a:effectLst/>
+                          <a:latin typeface="Calibri" panose="020F0502020204030204" pitchFamily="34" charset="0"/>
+                          <a:ea typeface="Calibri" panose="020F0502020204030204" pitchFamily="34" charset="0"/>
+                          <a:cs typeface="Times New Roman" panose="02020603050405020304" pitchFamily="18" charset="0"/>
+                        </a:rPr>
+                        <a:t>MEP1B</a:t>
+                      </a:r>
+                    </a:p>
+                  </a:txBody>
+                  <a:tcPr marL="68580" marR="68580" marT="0" marB="0"/>
+                </a:tc>
+                <a:tc>
+                  <a:txBody>
+                    <a:bodyPr/>
+                    <a:lstStyle/>
+                    <a:p>
+                      <a:pPr marL="0" marR="0" algn="l">
+                        <a:lnSpc>
+                          <a:spcPct val="107000"/>
+                        </a:lnSpc>
+                        <a:spcBef>
+                          <a:spcPts val="0"/>
+                        </a:spcBef>
+                        <a:spcAft>
+                          <a:spcPts val="0"/>
+                        </a:spcAft>
+                      </a:pPr>
+                      <a:r>
+                        <a:rPr lang="en-US" sz="1100" dirty="0">
+                          <a:effectLst/>
+                          <a:latin typeface="Calibri" panose="020F0502020204030204" pitchFamily="34" charset="0"/>
+                          <a:ea typeface="Calibri" panose="020F0502020204030204" pitchFamily="34" charset="0"/>
+                          <a:cs typeface="Times New Roman" panose="02020603050405020304" pitchFamily="18" charset="0"/>
+                        </a:rPr>
+                        <a:t>Protease subunit, well-established link to colorectal cancer</a:t>
+                      </a:r>
+                    </a:p>
+                  </a:txBody>
+                  <a:tcPr marL="68580" marR="68580" marT="0" marB="0"/>
+                </a:tc>
+                <a:extLst>
+                  <a:ext uri="{0D108BD9-81ED-4DB2-BD59-A6C34878D82A}">
+                    <a16:rowId xmlns:a16="http://schemas.microsoft.com/office/drawing/2014/main" val="10002"/>
+                  </a:ext>
+                </a:extLst>
+              </a:tr>
+              <a:tr h="250002">
+                <a:tc>
+                  <a:txBody>
+                    <a:bodyPr/>
+                    <a:lstStyle/>
+                    <a:p>
+                      <a:pPr marL="0" marR="0" algn="ctr">
+                        <a:lnSpc>
+                          <a:spcPct val="107000"/>
+                        </a:lnSpc>
+                        <a:spcBef>
+                          <a:spcPts val="0"/>
+                        </a:spcBef>
+                        <a:spcAft>
+                          <a:spcPts val="0"/>
+                        </a:spcAft>
+                      </a:pPr>
+                      <a:r>
+                        <a:rPr lang="en-US" sz="1100" dirty="0">
+                          <a:effectLst/>
+                          <a:latin typeface="Calibri" panose="020F0502020204030204" pitchFamily="34" charset="0"/>
+                          <a:ea typeface="Calibri" panose="020F0502020204030204" pitchFamily="34" charset="0"/>
+                          <a:cs typeface="Times New Roman" panose="02020603050405020304" pitchFamily="18" charset="0"/>
+                        </a:rPr>
+                        <a:t>8094028</a:t>
+                      </a:r>
+                    </a:p>
+                  </a:txBody>
+                  <a:tcPr marL="68580" marR="68580" marT="0" marB="0"/>
+                </a:tc>
+                <a:tc>
+                  <a:txBody>
+                    <a:bodyPr/>
+                    <a:lstStyle/>
+                    <a:p>
+                      <a:pPr marL="0" marR="0" algn="ctr">
+                        <a:lnSpc>
+                          <a:spcPct val="107000"/>
+                        </a:lnSpc>
+                        <a:spcBef>
+                          <a:spcPts val="0"/>
+                        </a:spcBef>
+                        <a:spcAft>
+                          <a:spcPts val="0"/>
+                        </a:spcAft>
+                      </a:pPr>
+                      <a:r>
+                        <a:rPr lang="en-US" sz="1100" dirty="0">
+                          <a:effectLst/>
+                          <a:latin typeface="Calibri" panose="020F0502020204030204" pitchFamily="34" charset="0"/>
+                          <a:ea typeface="Calibri" panose="020F0502020204030204" pitchFamily="34" charset="0"/>
+                          <a:cs typeface="Times New Roman" panose="02020603050405020304" pitchFamily="18" charset="0"/>
+                        </a:rPr>
+                        <a:t>AFAP1-AS1</a:t>
+                      </a:r>
+                    </a:p>
+                  </a:txBody>
+                  <a:tcPr marL="68580" marR="68580" marT="0" marB="0"/>
+                </a:tc>
+                <a:tc>
+                  <a:txBody>
+                    <a:bodyPr/>
+                    <a:lstStyle/>
+                    <a:p>
+                      <a:pPr marL="0" marR="0" algn="l">
+                        <a:lnSpc>
+                          <a:spcPct val="107000"/>
+                        </a:lnSpc>
+                        <a:spcBef>
+                          <a:spcPts val="0"/>
+                        </a:spcBef>
+                        <a:spcAft>
+                          <a:spcPts val="0"/>
+                        </a:spcAft>
+                      </a:pPr>
+                      <a:r>
+                        <a:rPr lang="en-US" sz="1100" dirty="0" err="1">
+                          <a:effectLst/>
+                          <a:latin typeface="Calibri" panose="020F0502020204030204" pitchFamily="34" charset="0"/>
+                          <a:ea typeface="Calibri" panose="020F0502020204030204" pitchFamily="34" charset="0"/>
+                          <a:cs typeface="Times New Roman" panose="02020603050405020304" pitchFamily="18" charset="0"/>
+                        </a:rPr>
+                        <a:t>nCRNA</a:t>
+                      </a:r>
+                      <a:r>
+                        <a:rPr lang="en-US" sz="1100" dirty="0">
+                          <a:effectLst/>
+                          <a:latin typeface="Calibri" panose="020F0502020204030204" pitchFamily="34" charset="0"/>
+                          <a:ea typeface="Calibri" panose="020F0502020204030204" pitchFamily="34" charset="0"/>
+                          <a:cs typeface="Times New Roman" panose="02020603050405020304" pitchFamily="18" charset="0"/>
+                        </a:rPr>
+                        <a:t>, overexpressed</a:t>
+                      </a:r>
+                      <a:r>
+                        <a:rPr lang="en-US" sz="1100" baseline="0" dirty="0">
+                          <a:effectLst/>
+                          <a:latin typeface="Calibri" panose="020F0502020204030204" pitchFamily="34" charset="0"/>
+                          <a:ea typeface="Calibri" panose="020F0502020204030204" pitchFamily="34" charset="0"/>
+                          <a:cs typeface="Times New Roman" panose="02020603050405020304" pitchFamily="18" charset="0"/>
+                        </a:rPr>
+                        <a:t> in various tumors</a:t>
                       </a:r>
                       <a:endParaRPr lang="en-US" sz="1100" dirty="0">
                         <a:effectLst/>
@@ -4971,6 +5222,13 @@
                   </a:txBody>
                   <a:tcPr marL="68580" marR="68580" marT="0" marB="0"/>
                 </a:tc>
+                <a:extLst>
+                  <a:ext uri="{0D108BD9-81ED-4DB2-BD59-A6C34878D82A}">
+                    <a16:rowId xmlns:a16="http://schemas.microsoft.com/office/drawing/2014/main" val="10003"/>
+                  </a:ext>
+                </a:extLst>
+              </a:tr>
+              <a:tr h="250002">
                 <a:tc>
                   <a:txBody>
                     <a:bodyPr/>
@@ -4988,13 +5246,80 @@
                         </a:spcAft>
                       </a:pPr>
                       <a:r>
-                        <a:rPr lang="en-US" sz="1100" dirty="0" smtClean="0">
+                        <a:rPr lang="en-US" sz="1100" dirty="0">
                           <a:effectLst/>
                           <a:latin typeface="Calibri" panose="020F0502020204030204" pitchFamily="34" charset="0"/>
                           <a:ea typeface="Calibri" panose="020F0502020204030204" pitchFamily="34" charset="0"/>
                           <a:cs typeface="Times New Roman" panose="02020603050405020304" pitchFamily="18" charset="0"/>
                         </a:rPr>
-                        <a:t>MEP1B</a:t>
+                        <a:t>8162514</a:t>
+                      </a:r>
+                    </a:p>
+                  </a:txBody>
+                  <a:tcPr marL="68580" marR="68580" marT="0" marB="0"/>
+                </a:tc>
+                <a:tc>
+                  <a:txBody>
+                    <a:bodyPr/>
+                    <a:lstStyle/>
+                    <a:p>
+                      <a:pPr marL="0" marR="0" algn="ctr">
+                        <a:lnSpc>
+                          <a:spcPct val="107000"/>
+                        </a:lnSpc>
+                        <a:spcBef>
+                          <a:spcPts val="0"/>
+                        </a:spcBef>
+                        <a:spcAft>
+                          <a:spcPts val="0"/>
+                        </a:spcAft>
+                      </a:pPr>
+                      <a:r>
+                        <a:rPr lang="en-US" sz="1100" dirty="0">
+                          <a:effectLst/>
+                          <a:latin typeface="Calibri" panose="020F0502020204030204" pitchFamily="34" charset="0"/>
+                          <a:ea typeface="Calibri" panose="020F0502020204030204" pitchFamily="34" charset="0"/>
+                          <a:cs typeface="Times New Roman" panose="02020603050405020304" pitchFamily="18" charset="0"/>
+                        </a:rPr>
+                        <a:t>FANCC</a:t>
+                      </a:r>
+                    </a:p>
+                  </a:txBody>
+                  <a:tcPr marL="68580" marR="68580" marT="0" marB="0"/>
+                </a:tc>
+                <a:tc>
+                  <a:txBody>
+                    <a:bodyPr/>
+                    <a:lstStyle/>
+                    <a:p>
+                      <a:pPr marL="0" marR="0" algn="l">
+                        <a:lnSpc>
+                          <a:spcPct val="107000"/>
+                        </a:lnSpc>
+                        <a:spcBef>
+                          <a:spcPts val="0"/>
+                        </a:spcBef>
+                        <a:spcAft>
+                          <a:spcPts val="0"/>
+                        </a:spcAft>
+                      </a:pPr>
+                      <a:r>
+                        <a:rPr lang="en-US" sz="1100" dirty="0">
+                          <a:effectLst/>
+                          <a:latin typeface="Calibri" panose="020F0502020204030204" pitchFamily="34" charset="0"/>
+                          <a:ea typeface="Calibri" panose="020F0502020204030204" pitchFamily="34" charset="0"/>
+                          <a:cs typeface="Times New Roman" panose="02020603050405020304" pitchFamily="18" charset="0"/>
+                        </a:rPr>
+                        <a:t>DNA-repair</a:t>
+                      </a:r>
+                      <a:r>
+                        <a:rPr lang="en-US" sz="1100" baseline="0" dirty="0">
+                          <a:effectLst/>
+                          <a:latin typeface="Calibri" panose="020F0502020204030204" pitchFamily="34" charset="0"/>
+                          <a:ea typeface="Calibri" panose="020F0502020204030204" pitchFamily="34" charset="0"/>
+                          <a:cs typeface="Times New Roman" panose="02020603050405020304" pitchFamily="18" charset="0"/>
+                        </a:rPr>
+                        <a:t> mechanism, mutations known to elevate cancer risk</a:t>
                       </a:r>
                       <a:endParaRPr lang="en-US" sz="1100" dirty="0">
                         <a:effectLst/>
@@ -5006,282 +5331,11 @@
                   </a:txBody>
                   <a:tcPr marL="68580" marR="68580" marT="0" marB="0"/>
                 </a:tc>
-                <a:tc>
-                  <a:txBody>
-                    <a:bodyPr/>
-                    <a:lstStyle/>
-                    <a:p>
-                      <a:pPr marL="0" marR="0" algn="l">
-                        <a:lnSpc>
-                          <a:spcPct val="107000"/>
-                        </a:lnSpc>
-                        <a:spcBef>
-                          <a:spcPts val="0"/>
-                        </a:spcBef>
-                        <a:spcAft>
-                          <a:spcPts val="0"/>
-                        </a:spcAft>
-                      </a:pPr>
-                      <a:r>
-                        <a:rPr lang="en-US" sz="1100" dirty="0" smtClean="0">
-                          <a:effectLst/>
-                          <a:latin typeface="Calibri" panose="020F0502020204030204" pitchFamily="34" charset="0"/>
-                          <a:ea typeface="Calibri" panose="020F0502020204030204" pitchFamily="34" charset="0"/>
-                          <a:cs typeface="Times New Roman" panose="02020603050405020304" pitchFamily="18" charset="0"/>
-                        </a:rPr>
-                        <a:t>Protease subunit, well-established link to colorectal cancer</a:t>
-                      </a:r>
-                      <a:endParaRPr lang="en-US" sz="1100" dirty="0">
-                        <a:effectLst/>
-                        <a:latin typeface="Calibri" panose="020F0502020204030204" pitchFamily="34" charset="0"/>
-                        <a:ea typeface="Calibri" panose="020F0502020204030204" pitchFamily="34" charset="0"/>
-                        <a:cs typeface="Times New Roman" panose="02020603050405020304" pitchFamily="18" charset="0"/>
-                      </a:endParaRPr>
-                    </a:p>
-                  </a:txBody>
-                  <a:tcPr marL="68580" marR="68580" marT="0" marB="0"/>
-                </a:tc>
-              </a:tr>
-              <a:tr h="250002">
-                <a:tc>
-                  <a:txBody>
-                    <a:bodyPr/>
-                    <a:lstStyle/>
-                    <a:p>
-                      <a:pPr marL="0" marR="0" algn="ctr">
-                        <a:lnSpc>
-                          <a:spcPct val="107000"/>
-                        </a:lnSpc>
-                        <a:spcBef>
-                          <a:spcPts val="0"/>
-                        </a:spcBef>
-                        <a:spcAft>
-                          <a:spcPts val="0"/>
-                        </a:spcAft>
-                      </a:pPr>
-                      <a:r>
-                        <a:rPr lang="en-US" sz="1100" dirty="0" smtClean="0">
-                          <a:effectLst/>
-                          <a:latin typeface="Calibri" panose="020F0502020204030204" pitchFamily="34" charset="0"/>
-                          <a:ea typeface="Calibri" panose="020F0502020204030204" pitchFamily="34" charset="0"/>
-                          <a:cs typeface="Times New Roman" panose="02020603050405020304" pitchFamily="18" charset="0"/>
-                        </a:rPr>
-                        <a:t>8094028</a:t>
-                      </a:r>
-                      <a:endParaRPr lang="en-US" sz="1100" dirty="0">
-                        <a:effectLst/>
-                        <a:latin typeface="Calibri" panose="020F0502020204030204" pitchFamily="34" charset="0"/>
-                        <a:ea typeface="Calibri" panose="020F0502020204030204" pitchFamily="34" charset="0"/>
-                        <a:cs typeface="Times New Roman" panose="02020603050405020304" pitchFamily="18" charset="0"/>
-                      </a:endParaRPr>
-                    </a:p>
-                  </a:txBody>
-                  <a:tcPr marL="68580" marR="68580" marT="0" marB="0"/>
-                </a:tc>
-                <a:tc>
-                  <a:txBody>
-                    <a:bodyPr/>
-                    <a:lstStyle/>
-                    <a:p>
-                      <a:pPr marL="0" marR="0" algn="ctr">
-                        <a:lnSpc>
-                          <a:spcPct val="107000"/>
-                        </a:lnSpc>
-                        <a:spcBef>
-                          <a:spcPts val="0"/>
-                        </a:spcBef>
-                        <a:spcAft>
-                          <a:spcPts val="0"/>
-                        </a:spcAft>
-                      </a:pPr>
-                      <a:r>
-                        <a:rPr lang="en-US" sz="1100" dirty="0" smtClean="0">
-                          <a:effectLst/>
-                          <a:latin typeface="Calibri" panose="020F0502020204030204" pitchFamily="34" charset="0"/>
-                          <a:ea typeface="Calibri" panose="020F0502020204030204" pitchFamily="34" charset="0"/>
-                          <a:cs typeface="Times New Roman" panose="02020603050405020304" pitchFamily="18" charset="0"/>
-                        </a:rPr>
-                        <a:t>AFAP1-AS1</a:t>
-                      </a:r>
-                      <a:endParaRPr lang="en-US" sz="1100" dirty="0">
-                        <a:effectLst/>
-                        <a:latin typeface="Calibri" panose="020F0502020204030204" pitchFamily="34" charset="0"/>
-                        <a:ea typeface="Calibri" panose="020F0502020204030204" pitchFamily="34" charset="0"/>
-                        <a:cs typeface="Times New Roman" panose="02020603050405020304" pitchFamily="18" charset="0"/>
-                      </a:endParaRPr>
-                    </a:p>
-                  </a:txBody>
-                  <a:tcPr marL="68580" marR="68580" marT="0" marB="0"/>
-                </a:tc>
-                <a:tc>
-                  <a:txBody>
-                    <a:bodyPr/>
-                    <a:lstStyle/>
-                    <a:p>
-                      <a:pPr marL="0" marR="0" algn="l">
-                        <a:lnSpc>
-                          <a:spcPct val="107000"/>
-                        </a:lnSpc>
-                        <a:spcBef>
-                          <a:spcPts val="0"/>
-                        </a:spcBef>
-                        <a:spcAft>
-                          <a:spcPts val="0"/>
-                        </a:spcAft>
-                      </a:pPr>
-                      <a:r>
-                        <a:rPr lang="en-US" sz="1100" dirty="0" err="1" smtClean="0">
-                          <a:effectLst/>
-                          <a:latin typeface="Calibri" panose="020F0502020204030204" pitchFamily="34" charset="0"/>
-                          <a:ea typeface="Calibri" panose="020F0502020204030204" pitchFamily="34" charset="0"/>
-                          <a:cs typeface="Times New Roman" panose="02020603050405020304" pitchFamily="18" charset="0"/>
-                        </a:rPr>
-                        <a:t>nCRNA</a:t>
-                      </a:r>
-                      <a:r>
-                        <a:rPr lang="en-US" sz="1100" dirty="0" smtClean="0">
-                          <a:effectLst/>
-                          <a:latin typeface="Calibri" panose="020F0502020204030204" pitchFamily="34" charset="0"/>
-                          <a:ea typeface="Calibri" panose="020F0502020204030204" pitchFamily="34" charset="0"/>
-                          <a:cs typeface="Times New Roman" panose="02020603050405020304" pitchFamily="18" charset="0"/>
-                        </a:rPr>
-                        <a:t>, overexpressed</a:t>
-                      </a:r>
-                      <a:r>
-                        <a:rPr lang="en-US" sz="1100" baseline="0" dirty="0" smtClean="0">
-                          <a:effectLst/>
-                          <a:latin typeface="Calibri" panose="020F0502020204030204" pitchFamily="34" charset="0"/>
-                          <a:ea typeface="Calibri" panose="020F0502020204030204" pitchFamily="34" charset="0"/>
-                          <a:cs typeface="Times New Roman" panose="02020603050405020304" pitchFamily="18" charset="0"/>
-                        </a:rPr>
-                        <a:t> in various tumors</a:t>
-                      </a:r>
-                      <a:endParaRPr lang="en-US" sz="1100" dirty="0">
-                        <a:effectLst/>
-                        <a:latin typeface="Calibri" panose="020F0502020204030204" pitchFamily="34" charset="0"/>
-                        <a:ea typeface="Calibri" panose="020F0502020204030204" pitchFamily="34" charset="0"/>
-                        <a:cs typeface="Times New Roman" panose="02020603050405020304" pitchFamily="18" charset="0"/>
-                      </a:endParaRPr>
-                    </a:p>
-                  </a:txBody>
-                  <a:tcPr marL="68580" marR="68580" marT="0" marB="0"/>
-                </a:tc>
-              </a:tr>
-              <a:tr h="250002">
-                <a:tc>
-                  <a:txBody>
-                    <a:bodyPr/>
-                    <a:lstStyle/>
-                    <a:p>
-                      <a:pPr marL="0" marR="0" algn="ctr">
-                        <a:lnSpc>
-                          <a:spcPct val="107000"/>
-                        </a:lnSpc>
-                        <a:spcBef>
-                          <a:spcPts val="0"/>
-                        </a:spcBef>
-                        <a:spcAft>
-                          <a:spcPts val="0"/>
-                        </a:spcAft>
-                      </a:pPr>
-                      <a:r>
-                        <a:rPr lang="en-US" sz="1100" dirty="0" smtClean="0">
-                          <a:effectLst/>
-                          <a:latin typeface="Calibri" panose="020F0502020204030204" pitchFamily="34" charset="0"/>
-                          <a:ea typeface="Calibri" panose="020F0502020204030204" pitchFamily="34" charset="0"/>
-                          <a:cs typeface="Times New Roman" panose="02020603050405020304" pitchFamily="18" charset="0"/>
-                        </a:rPr>
-                        <a:t>8162514</a:t>
-                      </a:r>
-                      <a:endParaRPr lang="en-US" sz="1100" dirty="0">
-                        <a:effectLst/>
-                        <a:latin typeface="Calibri" panose="020F0502020204030204" pitchFamily="34" charset="0"/>
-                        <a:ea typeface="Calibri" panose="020F0502020204030204" pitchFamily="34" charset="0"/>
-                        <a:cs typeface="Times New Roman" panose="02020603050405020304" pitchFamily="18" charset="0"/>
-                      </a:endParaRPr>
-                    </a:p>
-                  </a:txBody>
-                  <a:tcPr marL="68580" marR="68580" marT="0" marB="0"/>
-                </a:tc>
-                <a:tc>
-                  <a:txBody>
-                    <a:bodyPr/>
-                    <a:lstStyle/>
-                    <a:p>
-                      <a:pPr marL="0" marR="0" algn="ctr">
-                        <a:lnSpc>
-                          <a:spcPct val="107000"/>
-                        </a:lnSpc>
-                        <a:spcBef>
-                          <a:spcPts val="0"/>
-                        </a:spcBef>
-                        <a:spcAft>
-                          <a:spcPts val="0"/>
-                        </a:spcAft>
-                      </a:pPr>
-                      <a:r>
-                        <a:rPr lang="en-US" sz="1100" dirty="0" smtClean="0">
-                          <a:effectLst/>
-                          <a:latin typeface="Calibri" panose="020F0502020204030204" pitchFamily="34" charset="0"/>
-                          <a:ea typeface="Calibri" panose="020F0502020204030204" pitchFamily="34" charset="0"/>
-                          <a:cs typeface="Times New Roman" panose="02020603050405020304" pitchFamily="18" charset="0"/>
-                        </a:rPr>
-                        <a:t>FANCC</a:t>
-                      </a:r>
-                      <a:endParaRPr lang="en-US" sz="1100" dirty="0">
-                        <a:effectLst/>
-                        <a:latin typeface="Calibri" panose="020F0502020204030204" pitchFamily="34" charset="0"/>
-                        <a:ea typeface="Calibri" panose="020F0502020204030204" pitchFamily="34" charset="0"/>
-                        <a:cs typeface="Times New Roman" panose="02020603050405020304" pitchFamily="18" charset="0"/>
-                      </a:endParaRPr>
-                    </a:p>
-                  </a:txBody>
-                  <a:tcPr marL="68580" marR="68580" marT="0" marB="0"/>
-                </a:tc>
-                <a:tc>
-                  <a:txBody>
-                    <a:bodyPr/>
-                    <a:lstStyle/>
-                    <a:p>
-                      <a:pPr marL="0" marR="0" algn="l">
-                        <a:lnSpc>
-                          <a:spcPct val="107000"/>
-                        </a:lnSpc>
-                        <a:spcBef>
-                          <a:spcPts val="0"/>
-                        </a:spcBef>
-                        <a:spcAft>
-                          <a:spcPts val="0"/>
-                        </a:spcAft>
-                      </a:pPr>
-                      <a:r>
-                        <a:rPr lang="en-US" sz="1100" dirty="0" smtClean="0">
-                          <a:effectLst/>
-                          <a:latin typeface="Calibri" panose="020F0502020204030204" pitchFamily="34" charset="0"/>
-                          <a:ea typeface="Calibri" panose="020F0502020204030204" pitchFamily="34" charset="0"/>
-                          <a:cs typeface="Times New Roman" panose="02020603050405020304" pitchFamily="18" charset="0"/>
-                        </a:rPr>
-                        <a:t>DNA-repair</a:t>
-                      </a:r>
-                      <a:r>
-                        <a:rPr lang="en-US" sz="1100" baseline="0" dirty="0" smtClean="0">
-                          <a:effectLst/>
-                          <a:latin typeface="Calibri" panose="020F0502020204030204" pitchFamily="34" charset="0"/>
-                          <a:ea typeface="Calibri" panose="020F0502020204030204" pitchFamily="34" charset="0"/>
-                          <a:cs typeface="Times New Roman" panose="02020603050405020304" pitchFamily="18" charset="0"/>
-                        </a:rPr>
-                        <a:t> mechanism, mutations known to elevate cancer risk</a:t>
-                      </a:r>
-                      <a:endParaRPr lang="en-US" sz="1100" dirty="0">
-                        <a:effectLst/>
-                        <a:latin typeface="Calibri" panose="020F0502020204030204" pitchFamily="34" charset="0"/>
-                        <a:ea typeface="Calibri" panose="020F0502020204030204" pitchFamily="34" charset="0"/>
-                        <a:cs typeface="Times New Roman" panose="02020603050405020304" pitchFamily="18" charset="0"/>
-                      </a:endParaRPr>
-                    </a:p>
-                  </a:txBody>
-                  <a:tcPr marL="68580" marR="68580" marT="0" marB="0"/>
-                </a:tc>
+                <a:extLst>
+                  <a:ext uri="{0D108BD9-81ED-4DB2-BD59-A6C34878D82A}">
+                    <a16:rowId xmlns:a16="http://schemas.microsoft.com/office/drawing/2014/main" val="10004"/>
+                  </a:ext>
+                </a:extLst>
               </a:tr>
             </a:tbl>
           </a:graphicData>
@@ -5291,6 +5345,511 @@
     <p:extLst>
       <p:ext uri="{BB962C8B-B14F-4D97-AF65-F5344CB8AC3E}">
         <p14:creationId xmlns:p14="http://schemas.microsoft.com/office/powerpoint/2010/main" val="3780793010"/>
+      </p:ext>
+    </p:extLst>
+  </p:cSld>
+  <p:clrMapOvr>
+    <a:masterClrMapping/>
+  </p:clrMapOvr>
+</p:sld>
+</file>
+
+<file path=ppt/slides/slide3.xml><?xml version="1.0" encoding="utf-8"?>
+<p:sld xmlns:a="http://schemas.openxmlformats.org/drawingml/2006/main" xmlns:r="http://schemas.openxmlformats.org/officeDocument/2006/relationships" xmlns:p="http://schemas.openxmlformats.org/presentationml/2006/main">
+  <p:cSld>
+    <p:spTree>
+      <p:nvGrpSpPr>
+        <p:cNvPr id="1" name=""/>
+        <p:cNvGrpSpPr/>
+        <p:nvPr/>
+      </p:nvGrpSpPr>
+      <p:grpSpPr>
+        <a:xfrm>
+          <a:off x="0" y="0"/>
+          <a:ext cx="0" cy="0"/>
+          <a:chOff x="0" y="0"/>
+          <a:chExt cx="0" cy="0"/>
+        </a:xfrm>
+      </p:grpSpPr>
+      <p:grpSp>
+        <p:nvGrpSpPr>
+          <p:cNvPr id="15" name="Group 14">
+            <a:extLst>
+              <a:ext uri="{FF2B5EF4-FFF2-40B4-BE49-F238E27FC236}">
+                <a16:creationId xmlns:a16="http://schemas.microsoft.com/office/drawing/2014/main" id="{02BE4BB8-AC9C-4148-8241-E6B65047178C}"/>
+              </a:ext>
+            </a:extLst>
+          </p:cNvPr>
+          <p:cNvGrpSpPr/>
+          <p:nvPr/>
+        </p:nvGrpSpPr>
+        <p:grpSpPr>
+          <a:xfrm>
+            <a:off x="659734" y="1801185"/>
+            <a:ext cx="10216368" cy="3120842"/>
+            <a:chOff x="659734" y="1801185"/>
+            <a:chExt cx="10216368" cy="3120842"/>
+          </a:xfrm>
+        </p:grpSpPr>
+        <p:pic>
+          <p:nvPicPr>
+            <p:cNvPr id="4" name="Picture 3">
+              <a:extLst>
+                <a:ext uri="{FF2B5EF4-FFF2-40B4-BE49-F238E27FC236}">
+                  <a16:creationId xmlns:a16="http://schemas.microsoft.com/office/drawing/2014/main" id="{480ABEB3-063F-DC4E-AADC-CDB33B9BCC4A}"/>
+                </a:ext>
+              </a:extLst>
+            </p:cNvPr>
+            <p:cNvPicPr>
+              <a:picLocks noChangeAspect="1"/>
+            </p:cNvPicPr>
+            <p:nvPr/>
+          </p:nvPicPr>
+          <p:blipFill>
+            <a:blip r:embed="rId2"/>
+            <a:stretch>
+              <a:fillRect/>
+            </a:stretch>
+          </p:blipFill>
+          <p:spPr>
+            <a:xfrm>
+              <a:off x="1351102" y="1801185"/>
+              <a:ext cx="9525000" cy="2476500"/>
+            </a:xfrm>
+            <a:prstGeom prst="rect">
+              <a:avLst/>
+            </a:prstGeom>
+          </p:spPr>
+        </p:pic>
+        <p:cxnSp>
+          <p:nvCxnSpPr>
+            <p:cNvPr id="5" name="Straight Connector 4">
+              <a:extLst>
+                <a:ext uri="{FF2B5EF4-FFF2-40B4-BE49-F238E27FC236}">
+                  <a16:creationId xmlns:a16="http://schemas.microsoft.com/office/drawing/2014/main" id="{C80DF32A-6E9F-9248-B4E1-AC9740F483F5}"/>
+                </a:ext>
+              </a:extLst>
+            </p:cNvPr>
+            <p:cNvCxnSpPr>
+              <a:cxnSpLocks/>
+            </p:cNvCxnSpPr>
+            <p:nvPr/>
+          </p:nvCxnSpPr>
+          <p:spPr>
+            <a:xfrm>
+              <a:off x="1177448" y="2442646"/>
+              <a:ext cx="0" cy="1824648"/>
+            </a:xfrm>
+            <a:prstGeom prst="line">
+              <a:avLst/>
+            </a:prstGeom>
+            <a:noFill/>
+            <a:ln w="38100" cap="sq">
+              <a:solidFill>
+                <a:schemeClr val="tx1"/>
+              </a:solidFill>
+              <a:prstDash val="solid"/>
+              <a:round/>
+              <a:headEnd type="arrow"/>
+              <a:tailEnd type="arrow"/>
+            </a:ln>
+            <a:effectLst/>
+            <a:sp3d/>
+          </p:spPr>
+          <p:style>
+            <a:lnRef idx="0">
+              <a:scrgbClr r="0" g="0" b="0"/>
+            </a:lnRef>
+            <a:fillRef idx="0">
+              <a:scrgbClr r="0" g="0" b="0"/>
+            </a:fillRef>
+            <a:effectRef idx="0">
+              <a:scrgbClr r="0" g="0" b="0"/>
+            </a:effectRef>
+            <a:fontRef idx="none"/>
+          </p:style>
+        </p:cxnSp>
+        <p:cxnSp>
+          <p:nvCxnSpPr>
+            <p:cNvPr id="6" name="Straight Connector 5">
+              <a:extLst>
+                <a:ext uri="{FF2B5EF4-FFF2-40B4-BE49-F238E27FC236}">
+                  <a16:creationId xmlns:a16="http://schemas.microsoft.com/office/drawing/2014/main" id="{D5558122-9623-E942-8297-6210F3556DB6}"/>
+                </a:ext>
+              </a:extLst>
+            </p:cNvPr>
+            <p:cNvCxnSpPr>
+              <a:cxnSpLocks/>
+            </p:cNvCxnSpPr>
+            <p:nvPr/>
+          </p:nvCxnSpPr>
+          <p:spPr>
+            <a:xfrm flipH="1">
+              <a:off x="7444476" y="4454515"/>
+              <a:ext cx="3396901" cy="0"/>
+            </a:xfrm>
+            <a:prstGeom prst="line">
+              <a:avLst/>
+            </a:prstGeom>
+            <a:noFill/>
+            <a:ln w="38100" cap="sq">
+              <a:solidFill>
+                <a:srgbClr val="0070C0"/>
+              </a:solidFill>
+              <a:prstDash val="solid"/>
+              <a:round/>
+              <a:headEnd type="arrow"/>
+              <a:tailEnd type="arrow"/>
+            </a:ln>
+            <a:effectLst/>
+            <a:sp3d/>
+          </p:spPr>
+          <p:style>
+            <a:lnRef idx="0">
+              <a:scrgbClr r="0" g="0" b="0"/>
+            </a:lnRef>
+            <a:fillRef idx="0">
+              <a:scrgbClr r="0" g="0" b="0"/>
+            </a:fillRef>
+            <a:effectRef idx="0">
+              <a:scrgbClr r="0" g="0" b="0"/>
+            </a:effectRef>
+            <a:fontRef idx="none"/>
+          </p:style>
+        </p:cxnSp>
+        <p:cxnSp>
+          <p:nvCxnSpPr>
+            <p:cNvPr id="7" name="Straight Connector 6">
+              <a:extLst>
+                <a:ext uri="{FF2B5EF4-FFF2-40B4-BE49-F238E27FC236}">
+                  <a16:creationId xmlns:a16="http://schemas.microsoft.com/office/drawing/2014/main" id="{91F4E97E-B3FF-ED4E-A301-A7F17D5440C3}"/>
+                </a:ext>
+              </a:extLst>
+            </p:cNvPr>
+            <p:cNvCxnSpPr>
+              <a:cxnSpLocks/>
+            </p:cNvCxnSpPr>
+            <p:nvPr/>
+          </p:nvCxnSpPr>
+          <p:spPr>
+            <a:xfrm flipH="1">
+              <a:off x="3266017" y="4454515"/>
+              <a:ext cx="4120585" cy="0"/>
+            </a:xfrm>
+            <a:prstGeom prst="line">
+              <a:avLst/>
+            </a:prstGeom>
+            <a:noFill/>
+            <a:ln w="38100" cap="sq">
+              <a:solidFill>
+                <a:srgbClr val="C00000"/>
+              </a:solidFill>
+              <a:prstDash val="solid"/>
+              <a:round/>
+              <a:headEnd type="arrow"/>
+              <a:tailEnd type="arrow"/>
+            </a:ln>
+            <a:effectLst/>
+            <a:sp3d/>
+          </p:spPr>
+          <p:style>
+            <a:lnRef idx="0">
+              <a:scrgbClr r="0" g="0" b="0"/>
+            </a:lnRef>
+            <a:fillRef idx="0">
+              <a:scrgbClr r="0" g="0" b="0"/>
+            </a:fillRef>
+            <a:effectRef idx="0">
+              <a:scrgbClr r="0" g="0" b="0"/>
+            </a:effectRef>
+            <a:fontRef idx="none"/>
+          </p:style>
+        </p:cxnSp>
+        <p:sp>
+          <p:nvSpPr>
+            <p:cNvPr id="8" name="Rectangle 116">
+              <a:extLst>
+                <a:ext uri="{FF2B5EF4-FFF2-40B4-BE49-F238E27FC236}">
+                  <a16:creationId xmlns:a16="http://schemas.microsoft.com/office/drawing/2014/main" id="{11047387-47DD-0C4F-89C2-D3449DA1F65D}"/>
+                </a:ext>
+              </a:extLst>
+            </p:cNvPr>
+            <p:cNvSpPr txBox="1"/>
+            <p:nvPr/>
+          </p:nvSpPr>
+          <p:spPr>
+            <a:xfrm>
+              <a:off x="4061267" y="4491140"/>
+              <a:ext cx="2530084" cy="430887"/>
+            </a:xfrm>
+            <a:prstGeom prst="rect">
+              <a:avLst/>
+            </a:prstGeom>
+            <a:ln w="3175">
+              <a:miter lim="400000"/>
+            </a:ln>
+            <a:extLst>
+              <a:ext uri="{C572A759-6A51-4108-AA02-DFA0A04FC94B}">
+                <ma14:wrappingTextBoxFlag xmlns:ma14="http://schemas.microsoft.com/office/mac/drawingml/2011/main" xmlns:a14="http://schemas.microsoft.com/office/drawing/2010/main" xmlns:m="http://schemas.openxmlformats.org/officeDocument/2006/math" xmlns="" val="1"/>
+              </a:ext>
+            </a:extLst>
+          </p:spPr>
+          <p:txBody>
+            <a:bodyPr wrap="square" lIns="45719" rIns="45719" anchor="ctr">
+              <a:spAutoFit/>
+            </a:bodyPr>
+            <a:lstStyle>
+              <a:lvl1pPr algn="ctr" defTabSz="3511296">
+                <a:defRPr sz="3600">
+                  <a:latin typeface="Roboto Regular"/>
+                  <a:ea typeface="Roboto Regular"/>
+                  <a:cs typeface="Roboto Regular"/>
+                  <a:sym typeface="Roboto Regular"/>
+                </a:defRPr>
+              </a:lvl1pPr>
+            </a:lstStyle>
+            <a:p>
+              <a:r>
+                <a:rPr lang="en-US" sz="2200" dirty="0">
+                  <a:solidFill>
+                    <a:srgbClr val="C00000"/>
+                  </a:solidFill>
+                </a:rPr>
+                <a:t>Clinical Data</a:t>
+              </a:r>
+              <a:endParaRPr sz="2200" dirty="0">
+                <a:solidFill>
+                  <a:srgbClr val="C00000"/>
+                </a:solidFill>
+              </a:endParaRPr>
+            </a:p>
+          </p:txBody>
+        </p:sp>
+        <p:sp>
+          <p:nvSpPr>
+            <p:cNvPr id="9" name="Rectangle 116">
+              <a:extLst>
+                <a:ext uri="{FF2B5EF4-FFF2-40B4-BE49-F238E27FC236}">
+                  <a16:creationId xmlns:a16="http://schemas.microsoft.com/office/drawing/2014/main" id="{9AFC6FE2-774A-B643-97E8-842EBF00984B}"/>
+                </a:ext>
+              </a:extLst>
+            </p:cNvPr>
+            <p:cNvSpPr txBox="1"/>
+            <p:nvPr/>
+          </p:nvSpPr>
+          <p:spPr>
+            <a:xfrm>
+              <a:off x="7877884" y="4491140"/>
+              <a:ext cx="2530084" cy="430887"/>
+            </a:xfrm>
+            <a:prstGeom prst="rect">
+              <a:avLst/>
+            </a:prstGeom>
+            <a:ln w="3175">
+              <a:miter lim="400000"/>
+            </a:ln>
+            <a:extLst>
+              <a:ext uri="{C572A759-6A51-4108-AA02-DFA0A04FC94B}">
+                <ma14:wrappingTextBoxFlag xmlns:ma14="http://schemas.microsoft.com/office/mac/drawingml/2011/main" xmlns:a14="http://schemas.microsoft.com/office/drawing/2010/main" xmlns:m="http://schemas.openxmlformats.org/officeDocument/2006/math" xmlns="" val="1"/>
+              </a:ext>
+            </a:extLst>
+          </p:spPr>
+          <p:txBody>
+            <a:bodyPr wrap="square" lIns="45719" rIns="45719" anchor="ctr">
+              <a:spAutoFit/>
+            </a:bodyPr>
+            <a:lstStyle>
+              <a:lvl1pPr algn="ctr" defTabSz="3511296">
+                <a:defRPr sz="3600">
+                  <a:latin typeface="Roboto Regular"/>
+                  <a:ea typeface="Roboto Regular"/>
+                  <a:cs typeface="Roboto Regular"/>
+                  <a:sym typeface="Roboto Regular"/>
+                </a:defRPr>
+              </a:lvl1pPr>
+            </a:lstStyle>
+            <a:p>
+              <a:r>
+                <a:rPr lang="en-US" sz="2200" dirty="0">
+                  <a:solidFill>
+                    <a:srgbClr val="0070C0"/>
+                  </a:solidFill>
+                </a:rPr>
+                <a:t>32,321 Genes</a:t>
+              </a:r>
+              <a:endParaRPr sz="2200" dirty="0">
+                <a:solidFill>
+                  <a:srgbClr val="0070C0"/>
+                </a:solidFill>
+              </a:endParaRPr>
+            </a:p>
+          </p:txBody>
+        </p:sp>
+        <p:sp>
+          <p:nvSpPr>
+            <p:cNvPr id="10" name="Rectangle 116">
+              <a:extLst>
+                <a:ext uri="{FF2B5EF4-FFF2-40B4-BE49-F238E27FC236}">
+                  <a16:creationId xmlns:a16="http://schemas.microsoft.com/office/drawing/2014/main" id="{22221302-2863-5C48-B6F9-88DB3811F08B}"/>
+                </a:ext>
+              </a:extLst>
+            </p:cNvPr>
+            <p:cNvSpPr txBox="1"/>
+            <p:nvPr/>
+          </p:nvSpPr>
+          <p:spPr>
+            <a:xfrm rot="16200000">
+              <a:off x="32018" y="3139526"/>
+              <a:ext cx="1686319" cy="430887"/>
+            </a:xfrm>
+            <a:prstGeom prst="rect">
+              <a:avLst/>
+            </a:prstGeom>
+            <a:ln w="3175">
+              <a:miter lim="400000"/>
+            </a:ln>
+            <a:extLst>
+              <a:ext uri="{C572A759-6A51-4108-AA02-DFA0A04FC94B}">
+                <ma14:wrappingTextBoxFlag xmlns:ma14="http://schemas.microsoft.com/office/mac/drawingml/2011/main" xmlns:a14="http://schemas.microsoft.com/office/drawing/2010/main" xmlns:m="http://schemas.openxmlformats.org/officeDocument/2006/math" xmlns="" val="1"/>
+              </a:ext>
+            </a:extLst>
+          </p:spPr>
+          <p:txBody>
+            <a:bodyPr wrap="square" lIns="45719" rIns="45719" anchor="ctr">
+              <a:spAutoFit/>
+            </a:bodyPr>
+            <a:lstStyle>
+              <a:lvl1pPr algn="ctr" defTabSz="3511296">
+                <a:defRPr sz="3600">
+                  <a:latin typeface="Roboto Regular"/>
+                  <a:ea typeface="Roboto Regular"/>
+                  <a:cs typeface="Roboto Regular"/>
+                  <a:sym typeface="Roboto Regular"/>
+                </a:defRPr>
+              </a:lvl1pPr>
+            </a:lstStyle>
+            <a:p>
+              <a:pPr algn="l"/>
+              <a:r>
+                <a:rPr lang="en-US" sz="2200" dirty="0"/>
+                <a:t>484 Patients</a:t>
+              </a:r>
+            </a:p>
+          </p:txBody>
+        </p:sp>
+        <p:cxnSp>
+          <p:nvCxnSpPr>
+            <p:cNvPr id="11" name="Straight Connector 10">
+              <a:extLst>
+                <a:ext uri="{FF2B5EF4-FFF2-40B4-BE49-F238E27FC236}">
+                  <a16:creationId xmlns:a16="http://schemas.microsoft.com/office/drawing/2014/main" id="{4BD6428A-E33A-E541-B428-732BBD6ED9F5}"/>
+                </a:ext>
+              </a:extLst>
+            </p:cNvPr>
+            <p:cNvCxnSpPr>
+              <a:cxnSpLocks/>
+            </p:cNvCxnSpPr>
+            <p:nvPr/>
+          </p:nvCxnSpPr>
+          <p:spPr>
+            <a:xfrm flipH="1">
+              <a:off x="2630311" y="4455564"/>
+              <a:ext cx="564446" cy="0"/>
+            </a:xfrm>
+            <a:prstGeom prst="line">
+              <a:avLst/>
+            </a:prstGeom>
+            <a:noFill/>
+            <a:ln w="38100" cap="sq">
+              <a:solidFill>
+                <a:srgbClr val="00B050"/>
+              </a:solidFill>
+              <a:prstDash val="solid"/>
+              <a:round/>
+              <a:headEnd type="arrow"/>
+              <a:tailEnd type="arrow"/>
+            </a:ln>
+            <a:effectLst/>
+            <a:sp3d/>
+          </p:spPr>
+          <p:style>
+            <a:lnRef idx="0">
+              <a:scrgbClr r="0" g="0" b="0"/>
+            </a:lnRef>
+            <a:fillRef idx="0">
+              <a:scrgbClr r="0" g="0" b="0"/>
+            </a:fillRef>
+            <a:effectRef idx="0">
+              <a:scrgbClr r="0" g="0" b="0"/>
+            </a:effectRef>
+            <a:fontRef idx="none"/>
+          </p:style>
+        </p:cxnSp>
+        <p:sp>
+          <p:nvSpPr>
+            <p:cNvPr id="12" name="Rectangle 116">
+              <a:extLst>
+                <a:ext uri="{FF2B5EF4-FFF2-40B4-BE49-F238E27FC236}">
+                  <a16:creationId xmlns:a16="http://schemas.microsoft.com/office/drawing/2014/main" id="{5A4951D0-0C24-D74C-99AB-D41E29B1A84D}"/>
+                </a:ext>
+              </a:extLst>
+            </p:cNvPr>
+            <p:cNvSpPr txBox="1"/>
+            <p:nvPr/>
+          </p:nvSpPr>
+          <p:spPr>
+            <a:xfrm>
+              <a:off x="2362970" y="4491140"/>
+              <a:ext cx="1099128" cy="430887"/>
+            </a:xfrm>
+            <a:prstGeom prst="rect">
+              <a:avLst/>
+            </a:prstGeom>
+            <a:ln w="3175">
+              <a:miter lim="400000"/>
+            </a:ln>
+            <a:extLst>
+              <a:ext uri="{C572A759-6A51-4108-AA02-DFA0A04FC94B}">
+                <ma14:wrappingTextBoxFlag xmlns:ma14="http://schemas.microsoft.com/office/mac/drawingml/2011/main" xmlns:a14="http://schemas.microsoft.com/office/drawing/2010/main" xmlns:m="http://schemas.openxmlformats.org/officeDocument/2006/math" xmlns="" val="1"/>
+              </a:ext>
+            </a:extLst>
+          </p:spPr>
+          <p:txBody>
+            <a:bodyPr wrap="square" lIns="45719" rIns="45719" anchor="ctr">
+              <a:spAutoFit/>
+            </a:bodyPr>
+            <a:lstStyle>
+              <a:lvl1pPr algn="ctr" defTabSz="3511296">
+                <a:defRPr sz="3600">
+                  <a:latin typeface="Roboto Regular"/>
+                  <a:ea typeface="Roboto Regular"/>
+                  <a:cs typeface="Roboto Regular"/>
+                  <a:sym typeface="Roboto Regular"/>
+                </a:defRPr>
+              </a:lvl1pPr>
+            </a:lstStyle>
+            <a:p>
+              <a:r>
+                <a:rPr lang="en-US" sz="2200" dirty="0">
+                  <a:solidFill>
+                    <a:srgbClr val="00B050"/>
+                  </a:solidFill>
+                </a:rPr>
+                <a:t>Labels</a:t>
+              </a:r>
+              <a:endParaRPr sz="2200" dirty="0">
+                <a:solidFill>
+                  <a:srgbClr val="00B050"/>
+                </a:solidFill>
+              </a:endParaRPr>
+            </a:p>
+          </p:txBody>
+        </p:sp>
+      </p:grpSp>
+    </p:spTree>
+    <p:extLst>
+      <p:ext uri="{BB962C8B-B14F-4D97-AF65-F5344CB8AC3E}">
+        <p14:creationId xmlns:p14="http://schemas.microsoft.com/office/powerpoint/2010/main" val="4083464645"/>
       </p:ext>
     </p:extLst>
   </p:cSld>

</xml_diff>